<commit_message>
Introduction to source control
</commit_message>
<xml_diff>
--- a/presentations/DNdataflowStreams.pptx
+++ b/presentations/DNdataflowStreams.pptx
@@ -828,10 +828,10 @@
               <a:t>flic.kr</a:t>
             </a:r>
             <a:r>
-              <a:rPr lang="en-US" smtClean="0"/>
+              <a:rPr lang="en-US" dirty="0" smtClean="0"/>
               <a:t>/p/78gaTX</a:t>
             </a:r>
-            <a:endParaRPr lang="en-US"/>
+            <a:endParaRPr lang="en-US" dirty="0"/>
           </a:p>
         </p:txBody>
       </p:sp>

</xml_diff>

<commit_message>
update to the stream presentation
</commit_message>
<xml_diff>
--- a/presentations/DNdataflowStreams.pptx
+++ b/presentations/DNdataflowStreams.pptx
@@ -5,27 +5,29 @@
     <p:sldMasterId id="2147483648" r:id="rId1"/>
   </p:sldMasterIdLst>
   <p:notesMasterIdLst>
-    <p:notesMasterId r:id="rId20"/>
+    <p:notesMasterId r:id="rId22"/>
   </p:notesMasterIdLst>
   <p:sldIdLst>
     <p:sldId id="256" r:id="rId2"/>
-    <p:sldId id="273" r:id="rId3"/>
-    <p:sldId id="257" r:id="rId4"/>
-    <p:sldId id="276" r:id="rId5"/>
-    <p:sldId id="274" r:id="rId6"/>
-    <p:sldId id="275" r:id="rId7"/>
-    <p:sldId id="261" r:id="rId8"/>
-    <p:sldId id="262" r:id="rId9"/>
-    <p:sldId id="263" r:id="rId10"/>
-    <p:sldId id="264" r:id="rId11"/>
-    <p:sldId id="265" r:id="rId12"/>
-    <p:sldId id="266" r:id="rId13"/>
-    <p:sldId id="267" r:id="rId14"/>
-    <p:sldId id="268" r:id="rId15"/>
-    <p:sldId id="269" r:id="rId16"/>
-    <p:sldId id="270" r:id="rId17"/>
-    <p:sldId id="271" r:id="rId18"/>
-    <p:sldId id="272" r:id="rId19"/>
+    <p:sldId id="279" r:id="rId3"/>
+    <p:sldId id="273" r:id="rId4"/>
+    <p:sldId id="257" r:id="rId5"/>
+    <p:sldId id="276" r:id="rId6"/>
+    <p:sldId id="274" r:id="rId7"/>
+    <p:sldId id="275" r:id="rId8"/>
+    <p:sldId id="261" r:id="rId9"/>
+    <p:sldId id="278" r:id="rId10"/>
+    <p:sldId id="263" r:id="rId11"/>
+    <p:sldId id="264" r:id="rId12"/>
+    <p:sldId id="265" r:id="rId13"/>
+    <p:sldId id="266" r:id="rId14"/>
+    <p:sldId id="267" r:id="rId15"/>
+    <p:sldId id="268" r:id="rId16"/>
+    <p:sldId id="269" r:id="rId17"/>
+    <p:sldId id="277" r:id="rId18"/>
+    <p:sldId id="270" r:id="rId19"/>
+    <p:sldId id="271" r:id="rId20"/>
+    <p:sldId id="272" r:id="rId21"/>
   </p:sldIdLst>
   <p:sldSz cx="9144000" cy="6858000" type="screen4x3"/>
   <p:notesSz cx="6858000" cy="9144000"/>
@@ -209,7 +211,7 @@
           <a:p>
             <a:fld id="{E5E57440-7935-424A-92CA-B0E67B9A289B}" type="datetimeFigureOut">
               <a:rPr lang="en-US" smtClean="0"/>
-              <a:t>1/2/17</a:t>
+              <a:t>1/8/17</a:t>
             </a:fld>
             <a:endParaRPr lang="en-US"/>
           </a:p>
@@ -523,26 +525,24 @@
           <a:p>
             <a:r>
               <a:rPr lang="en-US" dirty="0" smtClean="0"/>
-              <a:t>Source is</a:t>
+              <a:t>Image</a:t>
             </a:r>
             <a:r>
               <a:rPr lang="en-US" baseline="0" dirty="0" smtClean="0"/>
-              <a:t> the beginning point of any stream.  </a:t>
-            </a:r>
-          </a:p>
-          <a:p>
-            <a:r>
-              <a:rPr lang="en-US" baseline="0" dirty="0" smtClean="0"/>
-              <a:t>A stream can only have one source</a:t>
-            </a:r>
-          </a:p>
-          <a:p>
-            <a:r>
-              <a:rPr lang="en-US" baseline="0" dirty="0" smtClean="0"/>
-              <a:t>A stream can only have one sink</a:t>
-            </a:r>
-          </a:p>
-          <a:p>
+              <a:t> by: </a:t>
+            </a:r>
+            <a:r>
+              <a:rPr lang="en-US" dirty="0" smtClean="0"/>
+              <a:t>https://</a:t>
+            </a:r>
+            <a:r>
+              <a:rPr lang="en-US" dirty="0" err="1" smtClean="0"/>
+              <a:t>flic.kr</a:t>
+            </a:r>
+            <a:r>
+              <a:rPr lang="en-US" dirty="0" smtClean="0"/>
+              <a:t>/p/g7AWzU</a:t>
+            </a:r>
             <a:endParaRPr lang="en-US" dirty="0"/>
           </a:p>
         </p:txBody>
@@ -564,7 +564,7 @@
           <a:p>
             <a:fld id="{F8391148-97EC-CA49-B378-21F69A05E275}" type="slidenum">
               <a:rPr lang="en-US" smtClean="0"/>
-              <a:t>2</a:t>
+              <a:t>1</a:t>
             </a:fld>
             <a:endParaRPr lang="en-US"/>
           </a:p>
@@ -573,7 +573,529 @@
     </p:spTree>
     <p:extLst>
       <p:ext uri="{BB962C8B-B14F-4D97-AF65-F5344CB8AC3E}">
-        <p14:creationId xmlns:p14="http://schemas.microsoft.com/office/powerpoint/2010/main" val="2643419999"/>
+        <p14:creationId xmlns:p14="http://schemas.microsoft.com/office/powerpoint/2010/main" val="948646917"/>
+      </p:ext>
+    </p:extLst>
+  </p:cSld>
+  <p:clrMapOvr>
+    <a:masterClrMapping/>
+  </p:clrMapOvr>
+</p:notes>
+</file>
+
+<file path=ppt/notesSlides/notesSlide10.xml><?xml version="1.0" encoding="utf-8"?>
+<p:notes xmlns:a="http://schemas.openxmlformats.org/drawingml/2006/main" xmlns:r="http://schemas.openxmlformats.org/officeDocument/2006/relationships" xmlns:p="http://schemas.openxmlformats.org/presentationml/2006/main">
+  <p:cSld>
+    <p:spTree>
+      <p:nvGrpSpPr>
+        <p:cNvPr id="1" name=""/>
+        <p:cNvGrpSpPr/>
+        <p:nvPr/>
+      </p:nvGrpSpPr>
+      <p:grpSpPr>
+        <a:xfrm>
+          <a:off x="0" y="0"/>
+          <a:ext cx="0" cy="0"/>
+          <a:chOff x="0" y="0"/>
+          <a:chExt cx="0" cy="0"/>
+        </a:xfrm>
+      </p:grpSpPr>
+      <p:sp>
+        <p:nvSpPr>
+          <p:cNvPr id="2" name="Slide Image Placeholder 1"/>
+          <p:cNvSpPr>
+            <a:spLocks noGrp="1" noRot="1" noChangeAspect="1"/>
+          </p:cNvSpPr>
+          <p:nvPr>
+            <p:ph type="sldImg"/>
+          </p:nvPr>
+        </p:nvSpPr>
+        <p:spPr/>
+      </p:sp>
+      <p:sp>
+        <p:nvSpPr>
+          <p:cNvPr id="3" name="Notes Placeholder 2"/>
+          <p:cNvSpPr>
+            <a:spLocks noGrp="1"/>
+          </p:cNvSpPr>
+          <p:nvPr>
+            <p:ph type="body" idx="1"/>
+          </p:nvPr>
+        </p:nvSpPr>
+        <p:spPr/>
+        <p:txBody>
+          <a:bodyPr/>
+          <a:lstStyle/>
+          <a:p>
+            <a:pPr marL="171450" indent="-171450">
+              <a:buFont typeface="Arial"/>
+              <a:buChar char="•"/>
+            </a:pPr>
+            <a:r>
+              <a:rPr lang="en-US" dirty="0" smtClean="0"/>
+              <a:t>Represents communication between 2 applications</a:t>
+            </a:r>
+          </a:p>
+          <a:p>
+            <a:pPr marL="171450" indent="-171450">
+              <a:buFont typeface="Arial"/>
+              <a:buChar char="•"/>
+            </a:pPr>
+            <a:r>
+              <a:rPr lang="en-US" dirty="0" smtClean="0"/>
+              <a:t>Brokers: Kafka, Rabbit currently supported (Yes JMS versions are in the works)</a:t>
+            </a:r>
+          </a:p>
+          <a:p>
+            <a:pPr marL="171450" indent="-171450">
+              <a:buFont typeface="Arial"/>
+              <a:buChar char="•"/>
+            </a:pPr>
+            <a:r>
+              <a:rPr lang="en-US" dirty="0" smtClean="0"/>
+              <a:t>Behind the scenes Creates a queue in Rabbit or a topic in Kafka </a:t>
+            </a:r>
+          </a:p>
+          <a:p>
+            <a:pPr marL="171450" indent="-171450">
+              <a:buFont typeface="Arial"/>
+              <a:buChar char="•"/>
+            </a:pPr>
+            <a:r>
+              <a:rPr lang="en-US" dirty="0" smtClean="0"/>
+              <a:t>Binds the 2 apps together</a:t>
+            </a:r>
+          </a:p>
+          <a:p>
+            <a:pPr marL="171450" indent="-171450">
+              <a:buFont typeface="Arial"/>
+              <a:buChar char="•"/>
+            </a:pPr>
+            <a:r>
+              <a:rPr lang="en-US" dirty="0" smtClean="0"/>
+              <a:t>Message Delivery Guarantees</a:t>
+            </a:r>
+          </a:p>
+          <a:p>
+            <a:pPr marL="171450" indent="-171450">
+              <a:buFont typeface="Arial"/>
+              <a:buChar char="•"/>
+            </a:pPr>
+            <a:r>
+              <a:rPr lang="en-US" dirty="0" smtClean="0"/>
+              <a:t>Configure Binder</a:t>
+            </a:r>
+            <a:endParaRPr lang="en-US" dirty="0"/>
+          </a:p>
+        </p:txBody>
+      </p:sp>
+      <p:sp>
+        <p:nvSpPr>
+          <p:cNvPr id="4" name="Slide Number Placeholder 3"/>
+          <p:cNvSpPr>
+            <a:spLocks noGrp="1"/>
+          </p:cNvSpPr>
+          <p:nvPr>
+            <p:ph type="sldNum" sz="quarter" idx="10"/>
+          </p:nvPr>
+        </p:nvSpPr>
+        <p:spPr/>
+        <p:txBody>
+          <a:bodyPr/>
+          <a:lstStyle/>
+          <a:p>
+            <a:fld id="{F8391148-97EC-CA49-B378-21F69A05E275}" type="slidenum">
+              <a:rPr lang="en-US" smtClean="0"/>
+              <a:t>15</a:t>
+            </a:fld>
+            <a:endParaRPr lang="en-US"/>
+          </a:p>
+        </p:txBody>
+      </p:sp>
+    </p:spTree>
+    <p:extLst>
+      <p:ext uri="{BB962C8B-B14F-4D97-AF65-F5344CB8AC3E}">
+        <p14:creationId xmlns:p14="http://schemas.microsoft.com/office/powerpoint/2010/main" val="3520590095"/>
+      </p:ext>
+    </p:extLst>
+  </p:cSld>
+  <p:clrMapOvr>
+    <a:masterClrMapping/>
+  </p:clrMapOvr>
+</p:notes>
+</file>
+
+<file path=ppt/notesSlides/notesSlide11.xml><?xml version="1.0" encoding="utf-8"?>
+<p:notes xmlns:a="http://schemas.openxmlformats.org/drawingml/2006/main" xmlns:r="http://schemas.openxmlformats.org/officeDocument/2006/relationships" xmlns:p="http://schemas.openxmlformats.org/presentationml/2006/main">
+  <p:cSld>
+    <p:spTree>
+      <p:nvGrpSpPr>
+        <p:cNvPr id="1" name=""/>
+        <p:cNvGrpSpPr/>
+        <p:nvPr/>
+      </p:nvGrpSpPr>
+      <p:grpSpPr>
+        <a:xfrm>
+          <a:off x="0" y="0"/>
+          <a:ext cx="0" cy="0"/>
+          <a:chOff x="0" y="0"/>
+          <a:chExt cx="0" cy="0"/>
+        </a:xfrm>
+      </p:grpSpPr>
+      <p:sp>
+        <p:nvSpPr>
+          <p:cNvPr id="2" name="Slide Image Placeholder 1"/>
+          <p:cNvSpPr>
+            <a:spLocks noGrp="1" noRot="1" noChangeAspect="1"/>
+          </p:cNvSpPr>
+          <p:nvPr>
+            <p:ph type="sldImg"/>
+          </p:nvPr>
+        </p:nvSpPr>
+        <p:spPr/>
+      </p:sp>
+      <p:sp>
+        <p:nvSpPr>
+          <p:cNvPr id="3" name="Notes Placeholder 2"/>
+          <p:cNvSpPr>
+            <a:spLocks noGrp="1"/>
+          </p:cNvSpPr>
+          <p:nvPr>
+            <p:ph type="body" idx="1"/>
+          </p:nvPr>
+        </p:nvSpPr>
+        <p:spPr/>
+        <p:txBody>
+          <a:bodyPr/>
+          <a:lstStyle/>
+          <a:p>
+            <a:pPr marL="171450" indent="-171450">
+              <a:buFont typeface="Arial"/>
+              <a:buChar char="•"/>
+            </a:pPr>
+            <a:r>
+              <a:rPr lang="en-US" dirty="0" smtClean="0"/>
+              <a:t>When you need a more complex Directed Graph than a simple linear stream</a:t>
+            </a:r>
+          </a:p>
+          <a:p>
+            <a:pPr marL="171450" indent="-171450">
+              <a:buFont typeface="Arial"/>
+              <a:buChar char="•"/>
+            </a:pPr>
+            <a:r>
+              <a:rPr lang="en-US" dirty="0" smtClean="0"/>
+              <a:t>Taps</a:t>
+            </a:r>
+          </a:p>
+          <a:p>
+            <a:pPr marL="171450" indent="-171450">
+              <a:buFont typeface="Arial"/>
+              <a:buChar char="•"/>
+            </a:pPr>
+            <a:r>
+              <a:rPr lang="en-US" dirty="0" smtClean="0"/>
+              <a:t>:</a:t>
+            </a:r>
+          </a:p>
+          <a:p>
+            <a:pPr marL="171450" indent="-171450">
+              <a:buFont typeface="Arial"/>
+              <a:buChar char="•"/>
+            </a:pPr>
+            <a:r>
+              <a:rPr lang="en-US" dirty="0" smtClean="0"/>
+              <a:t>Labels</a:t>
+            </a:r>
+          </a:p>
+          <a:p>
+            <a:pPr marL="171450" indent="-171450">
+              <a:buFont typeface="Arial"/>
+              <a:buChar char="•"/>
+            </a:pPr>
+            <a:r>
+              <a:rPr lang="en-US" dirty="0" smtClean="0"/>
+              <a:t>Demo</a:t>
+            </a:r>
+          </a:p>
+          <a:p>
+            <a:pPr marL="171450" indent="-171450">
+              <a:buFont typeface="Arial"/>
+              <a:buChar char="•"/>
+            </a:pPr>
+            <a:r>
+              <a:rPr lang="en-US" dirty="0" smtClean="0"/>
+              <a:t>Destinations </a:t>
+            </a:r>
+          </a:p>
+          <a:p>
+            <a:pPr marL="171450" indent="-171450">
+              <a:buFont typeface="Arial"/>
+              <a:buChar char="•"/>
+            </a:pPr>
+            <a:r>
+              <a:rPr lang="en-US" dirty="0" smtClean="0"/>
+              <a:t>Destination to sink</a:t>
+            </a:r>
+          </a:p>
+          <a:p>
+            <a:pPr marL="171450" indent="-171450">
+              <a:buFont typeface="Arial"/>
+              <a:buChar char="•"/>
+            </a:pPr>
+            <a:r>
+              <a:rPr lang="en-US" dirty="0" smtClean="0"/>
+              <a:t>Source to Destination</a:t>
+            </a:r>
+          </a:p>
+          <a:p>
+            <a:pPr marL="171450" indent="-171450">
+              <a:buFont typeface="Arial"/>
+              <a:buChar char="•"/>
+            </a:pPr>
+            <a:r>
+              <a:rPr lang="en-US" dirty="0" smtClean="0"/>
+              <a:t>Connect 2 destinations</a:t>
+            </a:r>
+            <a:endParaRPr lang="en-US" dirty="0"/>
+          </a:p>
+        </p:txBody>
+      </p:sp>
+      <p:sp>
+        <p:nvSpPr>
+          <p:cNvPr id="4" name="Slide Number Placeholder 3"/>
+          <p:cNvSpPr>
+            <a:spLocks noGrp="1"/>
+          </p:cNvSpPr>
+          <p:nvPr>
+            <p:ph type="sldNum" sz="quarter" idx="10"/>
+          </p:nvPr>
+        </p:nvSpPr>
+        <p:spPr/>
+        <p:txBody>
+          <a:bodyPr/>
+          <a:lstStyle/>
+          <a:p>
+            <a:fld id="{F8391148-97EC-CA49-B378-21F69A05E275}" type="slidenum">
+              <a:rPr lang="en-US" smtClean="0"/>
+              <a:t>16</a:t>
+            </a:fld>
+            <a:endParaRPr lang="en-US"/>
+          </a:p>
+        </p:txBody>
+      </p:sp>
+    </p:spTree>
+    <p:extLst>
+      <p:ext uri="{BB962C8B-B14F-4D97-AF65-F5344CB8AC3E}">
+        <p14:creationId xmlns:p14="http://schemas.microsoft.com/office/powerpoint/2010/main" val="872856952"/>
+      </p:ext>
+    </p:extLst>
+  </p:cSld>
+  <p:clrMapOvr>
+    <a:masterClrMapping/>
+  </p:clrMapOvr>
+</p:notes>
+</file>
+
+<file path=ppt/notesSlides/notesSlide12.xml><?xml version="1.0" encoding="utf-8"?>
+<p:notes xmlns:a="http://schemas.openxmlformats.org/drawingml/2006/main" xmlns:r="http://schemas.openxmlformats.org/officeDocument/2006/relationships" xmlns:p="http://schemas.openxmlformats.org/presentationml/2006/main">
+  <p:cSld>
+    <p:spTree>
+      <p:nvGrpSpPr>
+        <p:cNvPr id="1" name=""/>
+        <p:cNvGrpSpPr/>
+        <p:nvPr/>
+      </p:nvGrpSpPr>
+      <p:grpSpPr>
+        <a:xfrm>
+          <a:off x="0" y="0"/>
+          <a:ext cx="0" cy="0"/>
+          <a:chOff x="0" y="0"/>
+          <a:chExt cx="0" cy="0"/>
+        </a:xfrm>
+      </p:grpSpPr>
+      <p:sp>
+        <p:nvSpPr>
+          <p:cNvPr id="2" name="Slide Image Placeholder 1"/>
+          <p:cNvSpPr>
+            <a:spLocks noGrp="1" noRot="1" noChangeAspect="1"/>
+          </p:cNvSpPr>
+          <p:nvPr>
+            <p:ph type="sldImg"/>
+          </p:nvPr>
+        </p:nvSpPr>
+        <p:spPr/>
+      </p:sp>
+      <p:sp>
+        <p:nvSpPr>
+          <p:cNvPr id="3" name="Notes Placeholder 2"/>
+          <p:cNvSpPr>
+            <a:spLocks noGrp="1"/>
+          </p:cNvSpPr>
+          <p:nvPr>
+            <p:ph type="body" idx="1"/>
+          </p:nvPr>
+        </p:nvSpPr>
+        <p:spPr/>
+        <p:txBody>
+          <a:bodyPr/>
+          <a:lstStyle/>
+          <a:p>
+            <a:pPr marL="171450" indent="-171450">
+              <a:buFont typeface="Arial"/>
+              <a:buChar char="•"/>
+            </a:pPr>
+            <a:r>
+              <a:rPr lang="en-US" dirty="0" smtClean="0"/>
+              <a:t>stream create f --definition ":foo &gt; transform --expression=payload+'-foo' | log" --deploy</a:t>
+            </a:r>
+          </a:p>
+          <a:p>
+            <a:pPr marL="171450" indent="-171450">
+              <a:buFont typeface="Arial"/>
+              <a:buChar char="•"/>
+            </a:pPr>
+            <a:r>
+              <a:rPr lang="en-US" dirty="0" smtClean="0"/>
+              <a:t>stream create b --definition ":bar &gt; transform --expression=payload+'-bar' | log" --deploy</a:t>
+            </a:r>
+          </a:p>
+          <a:p>
+            <a:pPr marL="171450" indent="-171450">
+              <a:buFont typeface="Arial"/>
+              <a:buChar char="•"/>
+            </a:pPr>
+            <a:r>
+              <a:rPr lang="en-US" dirty="0" smtClean="0"/>
+              <a:t>stream create r --definition "http | router --expression=</a:t>
+            </a:r>
+            <a:r>
+              <a:rPr lang="en-US" dirty="0" err="1" smtClean="0"/>
+              <a:t>payload.contains</a:t>
+            </a:r>
+            <a:r>
+              <a:rPr lang="en-US" dirty="0" smtClean="0"/>
+              <a:t>('a')?':foo':':bar'" --deploy</a:t>
+            </a:r>
+            <a:endParaRPr lang="en-US" dirty="0"/>
+          </a:p>
+        </p:txBody>
+      </p:sp>
+      <p:sp>
+        <p:nvSpPr>
+          <p:cNvPr id="4" name="Slide Number Placeholder 3"/>
+          <p:cNvSpPr>
+            <a:spLocks noGrp="1"/>
+          </p:cNvSpPr>
+          <p:nvPr>
+            <p:ph type="sldNum" sz="quarter" idx="10"/>
+          </p:nvPr>
+        </p:nvSpPr>
+        <p:spPr/>
+        <p:txBody>
+          <a:bodyPr/>
+          <a:lstStyle/>
+          <a:p>
+            <a:fld id="{F8391148-97EC-CA49-B378-21F69A05E275}" type="slidenum">
+              <a:rPr lang="en-US" smtClean="0"/>
+              <a:t>17</a:t>
+            </a:fld>
+            <a:endParaRPr lang="en-US"/>
+          </a:p>
+        </p:txBody>
+      </p:sp>
+    </p:spTree>
+    <p:extLst>
+      <p:ext uri="{BB962C8B-B14F-4D97-AF65-F5344CB8AC3E}">
+        <p14:creationId xmlns:p14="http://schemas.microsoft.com/office/powerpoint/2010/main" val="3593886108"/>
+      </p:ext>
+    </p:extLst>
+  </p:cSld>
+  <p:clrMapOvr>
+    <a:masterClrMapping/>
+  </p:clrMapOvr>
+</p:notes>
+</file>
+
+<file path=ppt/notesSlides/notesSlide13.xml><?xml version="1.0" encoding="utf-8"?>
+<p:notes xmlns:a="http://schemas.openxmlformats.org/drawingml/2006/main" xmlns:r="http://schemas.openxmlformats.org/officeDocument/2006/relationships" xmlns:p="http://schemas.openxmlformats.org/presentationml/2006/main">
+  <p:cSld>
+    <p:spTree>
+      <p:nvGrpSpPr>
+        <p:cNvPr id="1" name=""/>
+        <p:cNvGrpSpPr/>
+        <p:nvPr/>
+      </p:nvGrpSpPr>
+      <p:grpSpPr>
+        <a:xfrm>
+          <a:off x="0" y="0"/>
+          <a:ext cx="0" cy="0"/>
+          <a:chOff x="0" y="0"/>
+          <a:chExt cx="0" cy="0"/>
+        </a:xfrm>
+      </p:grpSpPr>
+      <p:sp>
+        <p:nvSpPr>
+          <p:cNvPr id="2" name="Slide Image Placeholder 1"/>
+          <p:cNvSpPr>
+            <a:spLocks noGrp="1" noRot="1" noChangeAspect="1"/>
+          </p:cNvSpPr>
+          <p:nvPr>
+            <p:ph type="sldImg"/>
+          </p:nvPr>
+        </p:nvSpPr>
+        <p:spPr/>
+      </p:sp>
+      <p:sp>
+        <p:nvSpPr>
+          <p:cNvPr id="3" name="Notes Placeholder 2"/>
+          <p:cNvSpPr>
+            <a:spLocks noGrp="1"/>
+          </p:cNvSpPr>
+          <p:nvPr>
+            <p:ph type="body" idx="1"/>
+          </p:nvPr>
+        </p:nvSpPr>
+        <p:spPr/>
+        <p:txBody>
+          <a:bodyPr/>
+          <a:lstStyle/>
+          <a:p>
+            <a:r>
+              <a:rPr lang="en-US" dirty="0" smtClean="0"/>
+              <a:t>Need Demo</a:t>
+            </a:r>
+            <a:endParaRPr lang="en-US" dirty="0"/>
+          </a:p>
+        </p:txBody>
+      </p:sp>
+      <p:sp>
+        <p:nvSpPr>
+          <p:cNvPr id="4" name="Slide Number Placeholder 3"/>
+          <p:cNvSpPr>
+            <a:spLocks noGrp="1"/>
+          </p:cNvSpPr>
+          <p:nvPr>
+            <p:ph type="sldNum" sz="quarter" idx="10"/>
+          </p:nvPr>
+        </p:nvSpPr>
+        <p:spPr/>
+        <p:txBody>
+          <a:bodyPr/>
+          <a:lstStyle/>
+          <a:p>
+            <a:fld id="{F8391148-97EC-CA49-B378-21F69A05E275}" type="slidenum">
+              <a:rPr lang="en-US" smtClean="0"/>
+              <a:t>19</a:t>
+            </a:fld>
+            <a:endParaRPr lang="en-US"/>
+          </a:p>
+        </p:txBody>
+      </p:sp>
+    </p:spTree>
+    <p:extLst>
+      <p:ext uri="{BB962C8B-B14F-4D97-AF65-F5344CB8AC3E}">
+        <p14:creationId xmlns:p14="http://schemas.microsoft.com/office/powerpoint/2010/main" val="3233900271"/>
       </p:ext>
     </p:extLst>
   </p:cSld>
@@ -627,18 +1149,218 @@
           <a:bodyPr/>
           <a:lstStyle/>
           <a:p>
+            <a:pPr marL="171450" indent="-171450">
+              <a:buFont typeface="Arial"/>
+              <a:buChar char="•"/>
+            </a:pPr>
             <a:r>
               <a:rPr lang="en-US" dirty="0" smtClean="0"/>
-              <a:t>Image by: https://</a:t>
-            </a:r>
-            <a:r>
-              <a:rPr lang="en-US" dirty="0" err="1" smtClean="0"/>
-              <a:t>flic.kr</a:t>
-            </a:r>
+              <a:t>Streams are comprised of apps  </a:t>
+            </a:r>
+          </a:p>
+          <a:p>
+            <a:pPr marL="628650" lvl="1" indent="-171450">
+              <a:buFont typeface="Arial"/>
+              <a:buChar char="•"/>
+            </a:pPr>
             <a:r>
               <a:rPr lang="en-US" dirty="0" smtClean="0"/>
-              <a:t>/p/5xSL5</a:t>
-            </a:r>
+              <a:t>Looking</a:t>
+            </a:r>
+            <a:r>
+              <a:rPr lang="en-US" baseline="0" dirty="0" smtClean="0"/>
+              <a:t> at the simple </a:t>
+            </a:r>
+            <a:r>
+              <a:rPr lang="en-US" baseline="0" dirty="0" err="1" smtClean="0"/>
+              <a:t>ticktock</a:t>
+            </a:r>
+            <a:r>
+              <a:rPr lang="en-US" baseline="0" dirty="0" smtClean="0"/>
+              <a:t> app you just put together.  Has 2 apps time and log.</a:t>
+            </a:r>
+            <a:endParaRPr lang="en-US" dirty="0" smtClean="0"/>
+          </a:p>
+          <a:p>
+            <a:pPr marL="171450" indent="-171450">
+              <a:buFont typeface="Arial"/>
+              <a:buChar char="•"/>
+            </a:pPr>
+            <a:r>
+              <a:rPr lang="en-US" dirty="0" smtClean="0"/>
+              <a:t>So what makes up an</a:t>
+            </a:r>
+            <a:r>
+              <a:rPr lang="en-US" baseline="0" dirty="0" smtClean="0"/>
+              <a:t> app</a:t>
+            </a:r>
+            <a:endParaRPr lang="en-US" dirty="0" smtClean="0"/>
+          </a:p>
+          <a:p>
+            <a:pPr marL="171450" indent="-171450">
+              <a:buFont typeface="Arial"/>
+              <a:buChar char="•"/>
+            </a:pPr>
+            <a:r>
+              <a:rPr lang="en-US" dirty="0" smtClean="0"/>
+              <a:t>Spring </a:t>
+            </a:r>
+            <a:r>
+              <a:rPr lang="en-US" dirty="0" smtClean="0"/>
+              <a:t>boot app</a:t>
+            </a:r>
+          </a:p>
+          <a:p>
+            <a:pPr marL="171450" indent="-171450">
+              <a:buFont typeface="Arial"/>
+              <a:buChar char="•"/>
+            </a:pPr>
+            <a:r>
+              <a:rPr lang="en-US" dirty="0" smtClean="0"/>
+              <a:t>So we have all the good</a:t>
+            </a:r>
+            <a:r>
+              <a:rPr lang="en-US" baseline="0" dirty="0" smtClean="0"/>
+              <a:t> bits that come from spring boot</a:t>
+            </a:r>
+          </a:p>
+          <a:p>
+            <a:pPr marL="628650" lvl="1" indent="-171450">
+              <a:buFont typeface="Arial"/>
+              <a:buChar char="•"/>
+            </a:pPr>
+            <a:r>
+              <a:rPr lang="en-US" baseline="0" dirty="0" smtClean="0"/>
+              <a:t>Actuators for health and stats of an app</a:t>
+            </a:r>
+          </a:p>
+          <a:p>
+            <a:pPr marL="628650" lvl="1" indent="-171450">
+              <a:buFont typeface="Arial"/>
+              <a:buChar char="•"/>
+            </a:pPr>
+            <a:r>
+              <a:rPr lang="en-US" baseline="0" dirty="0" smtClean="0"/>
+              <a:t>Auto-Configure</a:t>
+            </a:r>
+          </a:p>
+          <a:p>
+            <a:pPr marL="628650" lvl="1" indent="-171450">
+              <a:buFont typeface="Arial"/>
+              <a:buChar char="•"/>
+            </a:pPr>
+            <a:r>
+              <a:rPr lang="en-US" baseline="0" dirty="0" smtClean="0"/>
+              <a:t>Obtaining properties for the app easily</a:t>
+            </a:r>
+          </a:p>
+          <a:p>
+            <a:pPr marL="171450" lvl="0" indent="-171450">
+              <a:buFont typeface="Arial"/>
+              <a:buChar char="•"/>
+            </a:pPr>
+            <a:r>
+              <a:rPr lang="en-US" baseline="0" dirty="0" smtClean="0"/>
+              <a:t>Spring Cloud Stream </a:t>
+            </a:r>
+          </a:p>
+          <a:p>
+            <a:pPr marL="628650" lvl="1" indent="-171450">
+              <a:buFont typeface="Arial"/>
+              <a:buChar char="•"/>
+            </a:pPr>
+            <a:r>
+              <a:rPr lang="en-US" baseline="0" dirty="0" smtClean="0"/>
+              <a:t>framework for building message-driven </a:t>
+            </a:r>
+            <a:r>
+              <a:rPr lang="en-US" baseline="0" dirty="0" err="1" smtClean="0"/>
+              <a:t>microservice</a:t>
+            </a:r>
+            <a:r>
+              <a:rPr lang="en-US" baseline="0" dirty="0" smtClean="0"/>
+              <a:t> applications</a:t>
+            </a:r>
+          </a:p>
+          <a:p>
+            <a:pPr marL="628650" lvl="1" indent="-171450">
+              <a:buFont typeface="Arial"/>
+              <a:buChar char="•"/>
+            </a:pPr>
+            <a:r>
+              <a:rPr lang="en-US" baseline="0" dirty="0" smtClean="0"/>
+              <a:t>Uses Spring Integration to provide connectivity to message brokers. </a:t>
+            </a:r>
+          </a:p>
+          <a:p>
+            <a:pPr marL="628650" lvl="1" indent="-171450">
+              <a:buFont typeface="Arial"/>
+              <a:buChar char="•"/>
+            </a:pPr>
+            <a:r>
+              <a:rPr lang="en-US" baseline="0" dirty="0" smtClean="0"/>
+              <a:t>It provides opinionated configuration of middleware from several vendors, </a:t>
+            </a:r>
+          </a:p>
+          <a:p>
+            <a:pPr marL="628650" lvl="1" indent="-171450">
+              <a:buFont typeface="Arial"/>
+              <a:buChar char="•"/>
+            </a:pPr>
+            <a:r>
+              <a:rPr lang="en-US" baseline="0" dirty="0" smtClean="0"/>
+              <a:t>introducing the concepts of </a:t>
+            </a:r>
+          </a:p>
+          <a:p>
+            <a:pPr marL="1085850" lvl="2" indent="-171450">
+              <a:buFont typeface="Arial"/>
+              <a:buChar char="•"/>
+            </a:pPr>
+            <a:r>
+              <a:rPr lang="en-US" baseline="0" dirty="0" smtClean="0"/>
+              <a:t>persistent publish-subscribe semantics,</a:t>
+            </a:r>
+          </a:p>
+          <a:p>
+            <a:pPr marL="1085850" lvl="2" indent="-171450">
+              <a:buFont typeface="Arial"/>
+              <a:buChar char="•"/>
+            </a:pPr>
+            <a:r>
+              <a:rPr lang="en-US" baseline="0" dirty="0" smtClean="0"/>
+              <a:t>consumer groups</a:t>
+            </a:r>
+          </a:p>
+          <a:p>
+            <a:pPr marL="1085850" lvl="2" indent="-171450">
+              <a:buFont typeface="Arial"/>
+              <a:buChar char="•"/>
+            </a:pPr>
+            <a:r>
+              <a:rPr lang="en-US" baseline="0" dirty="0" smtClean="0"/>
+              <a:t>partitions.</a:t>
+            </a:r>
+          </a:p>
+          <a:p>
+            <a:pPr marL="628650" lvl="1" indent="-171450">
+              <a:buFont typeface="Arial"/>
+              <a:buChar char="•"/>
+            </a:pPr>
+            <a:endParaRPr lang="en-US" baseline="0" dirty="0" smtClean="0"/>
+          </a:p>
+          <a:p>
+            <a:pPr marL="628650" lvl="1" indent="-171450">
+              <a:buFont typeface="Arial"/>
+              <a:buChar char="•"/>
+            </a:pPr>
+            <a:endParaRPr lang="en-US" dirty="0" smtClean="0"/>
+          </a:p>
+          <a:p>
+            <a:pPr marL="171450" indent="-171450">
+              <a:buFont typeface="Arial"/>
+              <a:buChar char="•"/>
+            </a:pPr>
             <a:endParaRPr lang="en-US" dirty="0"/>
           </a:p>
         </p:txBody>
@@ -660,7 +1382,7 @@
           <a:p>
             <a:fld id="{F8391148-97EC-CA49-B378-21F69A05E275}" type="slidenum">
               <a:rPr lang="en-US" smtClean="0"/>
-              <a:t>3</a:t>
+              <a:t>2</a:t>
             </a:fld>
             <a:endParaRPr lang="en-US"/>
           </a:p>
@@ -669,7 +1391,7 @@
     </p:spTree>
     <p:extLst>
       <p:ext uri="{BB962C8B-B14F-4D97-AF65-F5344CB8AC3E}">
-        <p14:creationId xmlns:p14="http://schemas.microsoft.com/office/powerpoint/2010/main" val="2197379668"/>
+        <p14:creationId xmlns:p14="http://schemas.microsoft.com/office/powerpoint/2010/main" val="3803718542"/>
       </p:ext>
     </p:extLst>
   </p:cSld>
@@ -725,16 +1447,66 @@
           <a:p>
             <a:r>
               <a:rPr lang="en-US" dirty="0" smtClean="0"/>
-              <a:t>Image by: https://</a:t>
-            </a:r>
-            <a:r>
-              <a:rPr lang="en-US" dirty="0" err="1" smtClean="0"/>
-              <a:t>flic.kr</a:t>
-            </a:r>
+              <a:t>A basic stream defines the ingestion of event driven data from a source to a sink that passes through any number of processors</a:t>
+            </a:r>
+          </a:p>
+          <a:p>
+            <a:pPr marL="171450" indent="-171450">
+              <a:buFontTx/>
+              <a:buChar char="•"/>
+            </a:pPr>
             <a:r>
               <a:rPr lang="en-US" dirty="0" smtClean="0"/>
-              <a:t>/p/9xg9uR</a:t>
-            </a:r>
+              <a:t>Source </a:t>
+            </a:r>
+            <a:r>
+              <a:rPr lang="en-US" dirty="0" smtClean="0"/>
+              <a:t>is</a:t>
+            </a:r>
+            <a:r>
+              <a:rPr lang="en-US" baseline="0" dirty="0" smtClean="0"/>
+              <a:t> the beginning point of any stream.  </a:t>
+            </a:r>
+            <a:endParaRPr lang="en-US" baseline="0" dirty="0" smtClean="0"/>
+          </a:p>
+          <a:p>
+            <a:pPr marL="171450" indent="-171450">
+              <a:buFontTx/>
+              <a:buChar char="•"/>
+            </a:pPr>
+            <a:r>
+              <a:rPr lang="en-US" baseline="0" dirty="0" smtClean="0"/>
+              <a:t>Sink is the termination point of a stream</a:t>
+            </a:r>
+            <a:endParaRPr lang="en-US" baseline="0" dirty="0" smtClean="0"/>
+          </a:p>
+          <a:p>
+            <a:pPr marL="171450" indent="-171450">
+              <a:buFont typeface="Arial"/>
+              <a:buChar char="•"/>
+            </a:pPr>
+            <a:r>
+              <a:rPr lang="en-US" baseline="0" dirty="0" smtClean="0"/>
+              <a:t>A </a:t>
+            </a:r>
+            <a:r>
+              <a:rPr lang="en-US" baseline="0" dirty="0" smtClean="0"/>
+              <a:t>stream can only have one </a:t>
+            </a:r>
+            <a:r>
+              <a:rPr lang="en-US" baseline="0" dirty="0" smtClean="0"/>
+              <a:t>source and one </a:t>
+            </a:r>
+            <a:r>
+              <a:rPr lang="en-US" baseline="0" dirty="0" smtClean="0"/>
+              <a:t>sink</a:t>
+            </a:r>
+          </a:p>
+          <a:p>
+            <a:pPr marL="171450" indent="-171450">
+              <a:buFont typeface="Arial"/>
+              <a:buChar char="•"/>
+            </a:pPr>
             <a:endParaRPr lang="en-US" dirty="0"/>
           </a:p>
         </p:txBody>
@@ -756,7 +1528,7 @@
           <a:p>
             <a:fld id="{F8391148-97EC-CA49-B378-21F69A05E275}" type="slidenum">
               <a:rPr lang="en-US" smtClean="0"/>
-              <a:t>4</a:t>
+              <a:t>3</a:t>
             </a:fld>
             <a:endParaRPr lang="en-US"/>
           </a:p>
@@ -765,7 +1537,7 @@
     </p:spTree>
     <p:extLst>
       <p:ext uri="{BB962C8B-B14F-4D97-AF65-F5344CB8AC3E}">
-        <p14:creationId xmlns:p14="http://schemas.microsoft.com/office/powerpoint/2010/main" val="4201228404"/>
+        <p14:creationId xmlns:p14="http://schemas.microsoft.com/office/powerpoint/2010/main" val="2643419999"/>
       </p:ext>
     </p:extLst>
   </p:cSld>
@@ -819,9 +1591,165 @@
           <a:bodyPr/>
           <a:lstStyle/>
           <a:p>
+            <a:pPr marL="171450" indent="-171450">
+              <a:buFont typeface="Arial"/>
+              <a:buChar char="•"/>
+            </a:pPr>
+            <a:r>
+              <a:rPr lang="en-US" dirty="0" err="1" smtClean="0"/>
+              <a:t>Pollable</a:t>
+            </a:r>
             <a:r>
               <a:rPr lang="en-US" dirty="0" smtClean="0"/>
-              <a:t>Image by: https://</a:t>
+              <a:t> </a:t>
+            </a:r>
+            <a:r>
+              <a:rPr lang="mr-IN" dirty="0" smtClean="0"/>
+              <a:t>–</a:t>
+            </a:r>
+            <a:r>
+              <a:rPr lang="en-US" dirty="0" smtClean="0"/>
+              <a:t> event fired</a:t>
+            </a:r>
+            <a:r>
+              <a:rPr lang="en-US" baseline="0" dirty="0" smtClean="0"/>
+              <a:t> by a timer to perform some action to acquire data to send down stream</a:t>
+            </a:r>
+          </a:p>
+          <a:p>
+            <a:pPr marL="628650" lvl="1" indent="-171450">
+              <a:buFont typeface="Arial"/>
+              <a:buChar char="•"/>
+            </a:pPr>
+            <a:r>
+              <a:rPr lang="en-US" baseline="0" dirty="0" smtClean="0"/>
+              <a:t>Examples:</a:t>
+            </a:r>
+          </a:p>
+          <a:p>
+            <a:pPr marL="1085850" lvl="2" indent="-171450">
+              <a:buFont typeface="Arial"/>
+              <a:buChar char="•"/>
+            </a:pPr>
+            <a:r>
+              <a:rPr lang="en-US" baseline="0" dirty="0" smtClean="0"/>
+              <a:t>File</a:t>
+            </a:r>
+          </a:p>
+          <a:p>
+            <a:pPr marL="1085850" lvl="2" indent="-171450">
+              <a:buFont typeface="Arial"/>
+              <a:buChar char="•"/>
+            </a:pPr>
+            <a:r>
+              <a:rPr lang="en-US" baseline="0" dirty="0" err="1" smtClean="0"/>
+              <a:t>Jdbc</a:t>
+            </a:r>
+            <a:r>
+              <a:rPr lang="en-US" baseline="0" dirty="0" smtClean="0"/>
+              <a:t> </a:t>
+            </a:r>
+          </a:p>
+          <a:p>
+            <a:pPr marL="1085850" lvl="2" indent="-171450">
+              <a:buFont typeface="Arial"/>
+              <a:buChar char="•"/>
+            </a:pPr>
+            <a:r>
+              <a:rPr lang="en-US" baseline="0" dirty="0" smtClean="0"/>
+              <a:t>Trigger</a:t>
+            </a:r>
+          </a:p>
+          <a:p>
+            <a:pPr marL="1085850" lvl="2" indent="-171450">
+              <a:buFont typeface="Arial"/>
+              <a:buChar char="•"/>
+            </a:pPr>
+            <a:r>
+              <a:rPr lang="en-US" baseline="0" dirty="0" err="1" smtClean="0"/>
+              <a:t>WebService</a:t>
+            </a:r>
+            <a:endParaRPr lang="en-US" baseline="0" dirty="0" smtClean="0"/>
+          </a:p>
+          <a:p>
+            <a:pPr marL="171450" lvl="0" indent="-171450">
+              <a:buFont typeface="Arial"/>
+              <a:buChar char="•"/>
+            </a:pPr>
+            <a:r>
+              <a:rPr lang="en-US" baseline="0" dirty="0" smtClean="0"/>
+              <a:t>Event </a:t>
+            </a:r>
+            <a:r>
+              <a:rPr lang="mr-IN" baseline="0" dirty="0" smtClean="0"/>
+              <a:t>–</a:t>
+            </a:r>
+            <a:r>
+              <a:rPr lang="en-US" baseline="0" dirty="0" smtClean="0"/>
+              <a:t> Awaits to receive data from exterior source</a:t>
+            </a:r>
+          </a:p>
+          <a:p>
+            <a:pPr marL="628650" lvl="1" indent="-171450">
+              <a:buFont typeface="Arial"/>
+              <a:buChar char="•"/>
+            </a:pPr>
+            <a:r>
+              <a:rPr lang="en-US" baseline="0" dirty="0" smtClean="0"/>
+              <a:t>JMS</a:t>
+            </a:r>
+          </a:p>
+          <a:p>
+            <a:pPr marL="628650" lvl="1" indent="-171450">
+              <a:buFont typeface="Arial"/>
+              <a:buChar char="•"/>
+            </a:pPr>
+            <a:r>
+              <a:rPr lang="en-US" baseline="0" dirty="0" smtClean="0"/>
+              <a:t>HTTP</a:t>
+            </a:r>
+          </a:p>
+          <a:p>
+            <a:pPr marL="628650" lvl="1" indent="-171450">
+              <a:buFont typeface="Arial"/>
+              <a:buChar char="•"/>
+            </a:pPr>
+            <a:r>
+              <a:rPr lang="en-US" baseline="0" dirty="0" smtClean="0"/>
+              <a:t>TCP</a:t>
+            </a:r>
+          </a:p>
+          <a:p>
+            <a:pPr marL="628650" lvl="1" indent="-171450">
+              <a:buFont typeface="Arial"/>
+              <a:buChar char="•"/>
+            </a:pPr>
+            <a:r>
+              <a:rPr lang="en-US" baseline="0" dirty="0" smtClean="0"/>
+              <a:t>Rabbit</a:t>
+            </a:r>
+          </a:p>
+          <a:p>
+            <a:pPr marL="1085850" lvl="2" indent="-171450">
+              <a:buFont typeface="Arial"/>
+              <a:buChar char="•"/>
+            </a:pPr>
+            <a:endParaRPr lang="en-US" dirty="0" smtClean="0"/>
+          </a:p>
+          <a:p>
+            <a:endParaRPr lang="en-US" dirty="0" smtClean="0"/>
+          </a:p>
+          <a:p>
+            <a:endParaRPr lang="en-US" dirty="0" smtClean="0"/>
+          </a:p>
+          <a:p>
+            <a:r>
+              <a:rPr lang="en-US" dirty="0" smtClean="0"/>
+              <a:t>Image </a:t>
+            </a:r>
+            <a:r>
+              <a:rPr lang="en-US" dirty="0" smtClean="0"/>
+              <a:t>by: https://</a:t>
             </a:r>
             <a:r>
               <a:rPr lang="en-US" dirty="0" err="1" smtClean="0"/>
@@ -829,7 +1757,7 @@
             </a:r>
             <a:r>
               <a:rPr lang="en-US" dirty="0" smtClean="0"/>
-              <a:t>/p/78gaTX</a:t>
+              <a:t>/p/5xSL5</a:t>
             </a:r>
             <a:endParaRPr lang="en-US" dirty="0"/>
           </a:p>
@@ -852,7 +1780,7 @@
           <a:p>
             <a:fld id="{F8391148-97EC-CA49-B378-21F69A05E275}" type="slidenum">
               <a:rPr lang="en-US" smtClean="0"/>
-              <a:t>6</a:t>
+              <a:t>4</a:t>
             </a:fld>
             <a:endParaRPr lang="en-US"/>
           </a:p>
@@ -861,7 +1789,7 @@
     </p:spTree>
     <p:extLst>
       <p:ext uri="{BB962C8B-B14F-4D97-AF65-F5344CB8AC3E}">
-        <p14:creationId xmlns:p14="http://schemas.microsoft.com/office/powerpoint/2010/main" val="1373570517"/>
+        <p14:creationId xmlns:p14="http://schemas.microsoft.com/office/powerpoint/2010/main" val="2197379668"/>
       </p:ext>
     </p:extLst>
   </p:cSld>
@@ -921,7 +1849,7 @@
             </a:pPr>
             <a:r>
               <a:rPr lang="en-US" dirty="0" smtClean="0"/>
-              <a:t>Basic discussion on the apps </a:t>
+              <a:t>Termination point of the stream</a:t>
             </a:r>
           </a:p>
           <a:p>
@@ -931,59 +1859,74 @@
             </a:pPr>
             <a:r>
               <a:rPr lang="en-US" dirty="0" smtClean="0"/>
-              <a:t>Spring boot app</a:t>
-            </a:r>
-          </a:p>
-          <a:p>
-            <a:pPr marL="171450" indent="-171450">
+              <a:t>Performs</a:t>
+            </a:r>
+            <a:r>
+              <a:rPr lang="en-US" baseline="0" dirty="0" smtClean="0"/>
+              <a:t> some action on the messages it receives</a:t>
+            </a:r>
+          </a:p>
+          <a:p>
+            <a:pPr marL="628650" lvl="1" indent="-171450">
               <a:buFont typeface="Arial"/>
               <a:buChar char="•"/>
             </a:pPr>
             <a:r>
-              <a:rPr lang="en-US" dirty="0" smtClean="0"/>
-              <a:t>Built using Spring Cloud Stream</a:t>
-            </a:r>
-          </a:p>
-          <a:p>
-            <a:pPr marL="171450" indent="-171450">
+              <a:rPr lang="en-US" baseline="0" dirty="0" smtClean="0"/>
+              <a:t>Send message out to another messaging system (Kafka, Rabbit, JMS)</a:t>
+            </a:r>
+          </a:p>
+          <a:p>
+            <a:pPr marL="628650" lvl="1" indent="-171450">
               <a:buFont typeface="Arial"/>
               <a:buChar char="•"/>
             </a:pPr>
             <a:r>
-              <a:rPr lang="en-US" dirty="0" smtClean="0"/>
-              <a:t>Each app is configurable via --properties</a:t>
-            </a:r>
-          </a:p>
-          <a:p>
-            <a:pPr marL="171450" indent="-171450">
+              <a:rPr lang="en-US" baseline="0" dirty="0" smtClean="0"/>
+              <a:t>Store data to repository(JDBC, Mongo)</a:t>
+            </a:r>
+          </a:p>
+          <a:p>
+            <a:pPr marL="628650" lvl="1" indent="-171450">
               <a:buFont typeface="Arial"/>
               <a:buChar char="•"/>
             </a:pPr>
             <a:r>
-              <a:rPr lang="en-US" dirty="0" smtClean="0"/>
-              <a:t>Demo</a:t>
-            </a:r>
-          </a:p>
-          <a:p>
-            <a:pPr marL="171450" indent="-171450">
+              <a:rPr lang="en-US" baseline="0" dirty="0" smtClean="0"/>
+              <a:t>Send data to external system (FTP, S3, Mail, HTTP)</a:t>
+            </a:r>
+          </a:p>
+          <a:p>
+            <a:pPr marL="628650" lvl="1" indent="-171450">
               <a:buFont typeface="Arial"/>
               <a:buChar char="•"/>
             </a:pPr>
-            <a:r>
-              <a:rPr lang="en-US" dirty="0" smtClean="0"/>
-              <a:t>You can use the --</a:t>
-            </a:r>
-            <a:r>
-              <a:rPr lang="en-US" dirty="0" err="1" smtClean="0"/>
-              <a:t>propertiesFile</a:t>
-            </a:r>
-            <a:endParaRPr lang="en-US" dirty="0" smtClean="0"/>
-          </a:p>
-          <a:p>
-            <a:pPr marL="171450" indent="-171450">
+            <a:endParaRPr lang="en-US" baseline="0" smtClean="0"/>
+          </a:p>
+          <a:p>
+            <a:pPr marL="628650" lvl="1" indent="-171450">
               <a:buFont typeface="Arial"/>
               <a:buChar char="•"/>
             </a:pPr>
+            <a:endParaRPr lang="en-US" dirty="0" smtClean="0"/>
+          </a:p>
+          <a:p>
+            <a:r>
+              <a:rPr lang="en-US" dirty="0" smtClean="0"/>
+              <a:t>Image </a:t>
+            </a:r>
+            <a:r>
+              <a:rPr lang="en-US" dirty="0" smtClean="0"/>
+              <a:t>by: https://</a:t>
+            </a:r>
+            <a:r>
+              <a:rPr lang="en-US" dirty="0" err="1" smtClean="0"/>
+              <a:t>flic.kr</a:t>
+            </a:r>
+            <a:r>
+              <a:rPr lang="en-US" dirty="0" smtClean="0"/>
+              <a:t>/p/9xg9uR</a:t>
+            </a:r>
             <a:endParaRPr lang="en-US" dirty="0"/>
           </a:p>
         </p:txBody>
@@ -1005,7 +1948,7 @@
           <a:p>
             <a:fld id="{F8391148-97EC-CA49-B378-21F69A05E275}" type="slidenum">
               <a:rPr lang="en-US" smtClean="0"/>
-              <a:t>8</a:t>
+              <a:t>5</a:t>
             </a:fld>
             <a:endParaRPr lang="en-US"/>
           </a:p>
@@ -1014,7 +1957,7 @@
     </p:spTree>
     <p:extLst>
       <p:ext uri="{BB962C8B-B14F-4D97-AF65-F5344CB8AC3E}">
-        <p14:creationId xmlns:p14="http://schemas.microsoft.com/office/powerpoint/2010/main" val="3803718542"/>
+        <p14:creationId xmlns:p14="http://schemas.microsoft.com/office/powerpoint/2010/main" val="4201228404"/>
       </p:ext>
     </p:extLst>
   </p:cSld>
@@ -1073,8 +2016,8 @@
               <a:buChar char="•"/>
             </a:pPr>
             <a:r>
-              <a:rPr lang="en-US" dirty="0" smtClean="0"/>
-              <a:t>Represents communication between 2 applications</a:t>
+              <a:rPr lang="en-US" baseline="0" dirty="0" smtClean="0"/>
+              <a:t>Processors alter, route or filter messages in the stream</a:t>
             </a:r>
           </a:p>
           <a:p>
@@ -1083,49 +2026,11 @@
               <a:buChar char="•"/>
             </a:pPr>
             <a:r>
-              <a:rPr lang="en-US" dirty="0" smtClean="0"/>
-              <a:t>Brokers: Kafka, Rabbit currently supported (Yes JMS versions are in the works)</a:t>
-            </a:r>
-          </a:p>
-          <a:p>
-            <a:pPr marL="171450" indent="-171450">
-              <a:buFont typeface="Arial"/>
-              <a:buChar char="•"/>
-            </a:pPr>
-            <a:r>
-              <a:rPr lang="en-US" dirty="0" smtClean="0"/>
-              <a:t>Behind the scenes Creates a queue in Rabbit or a topic in Kafka </a:t>
-            </a:r>
-          </a:p>
-          <a:p>
-            <a:pPr marL="171450" indent="-171450">
-              <a:buFont typeface="Arial"/>
-              <a:buChar char="•"/>
-            </a:pPr>
-            <a:r>
-              <a:rPr lang="en-US" dirty="0" smtClean="0"/>
-              <a:t>Binds the 2 apps together</a:t>
-            </a:r>
-          </a:p>
-          <a:p>
-            <a:pPr marL="171450" indent="-171450">
-              <a:buFont typeface="Arial"/>
-              <a:buChar char="•"/>
-            </a:pPr>
-            <a:r>
-              <a:rPr lang="en-US" dirty="0" smtClean="0"/>
-              <a:t>Message Delivery Guarantees</a:t>
-            </a:r>
-          </a:p>
-          <a:p>
-            <a:pPr marL="171450" indent="-171450">
-              <a:buFont typeface="Arial"/>
-              <a:buChar char="•"/>
-            </a:pPr>
-            <a:r>
-              <a:rPr lang="en-US" dirty="0" smtClean="0"/>
-              <a:t>Configure Binder</a:t>
-            </a:r>
+              <a:rPr lang="en-US" baseline="0" dirty="0" smtClean="0"/>
+              <a:t>Stream may have zero or more processors</a:t>
+            </a:r>
+          </a:p>
+          <a:p>
             <a:endParaRPr lang="en-US" dirty="0"/>
           </a:p>
         </p:txBody>
@@ -1147,7 +2052,7 @@
           <a:p>
             <a:fld id="{F8391148-97EC-CA49-B378-21F69A05E275}" type="slidenum">
               <a:rPr lang="en-US" smtClean="0"/>
-              <a:t>14</a:t>
+              <a:t>6</a:t>
             </a:fld>
             <a:endParaRPr lang="en-US"/>
           </a:p>
@@ -1156,7 +2061,7 @@
     </p:spTree>
     <p:extLst>
       <p:ext uri="{BB962C8B-B14F-4D97-AF65-F5344CB8AC3E}">
-        <p14:creationId xmlns:p14="http://schemas.microsoft.com/office/powerpoint/2010/main" val="3520590095"/>
+        <p14:creationId xmlns:p14="http://schemas.microsoft.com/office/powerpoint/2010/main" val="4139437610"/>
       </p:ext>
     </p:extLst>
   </p:cSld>
@@ -1210,93 +2115,72 @@
           <a:bodyPr/>
           <a:lstStyle/>
           <a:p>
-            <a:pPr marL="171450" indent="-171450">
+            <a:pPr marL="628650" lvl="1" indent="-171450">
               <a:buFont typeface="Arial"/>
               <a:buChar char="•"/>
             </a:pPr>
             <a:r>
-              <a:rPr lang="en-US" dirty="0" smtClean="0"/>
-              <a:t>When you need a more complex Directed Graph than a simple linear stream</a:t>
-            </a:r>
-          </a:p>
-          <a:p>
-            <a:pPr marL="171450" indent="-171450">
+              <a:rPr lang="en-US" baseline="0" dirty="0" smtClean="0"/>
+              <a:t>Transform</a:t>
+            </a:r>
+          </a:p>
+          <a:p>
+            <a:pPr marL="171450" lvl="0" indent="-171450">
               <a:buFont typeface="Arial"/>
               <a:buChar char="•"/>
             </a:pPr>
             <a:r>
-              <a:rPr lang="en-US" dirty="0" smtClean="0"/>
-              <a:t>Taps</a:t>
-            </a:r>
-          </a:p>
-          <a:p>
-            <a:pPr marL="171450" indent="-171450">
+              <a:rPr lang="en-US" baseline="0" dirty="0" smtClean="0"/>
+              <a:t>Enrich</a:t>
+            </a:r>
+          </a:p>
+          <a:p>
+            <a:pPr marL="171450" lvl="0" indent="-171450">
               <a:buFont typeface="Arial"/>
               <a:buChar char="•"/>
             </a:pPr>
             <a:r>
-              <a:rPr lang="en-US" dirty="0" smtClean="0"/>
-              <a:t>:</a:t>
-            </a:r>
-          </a:p>
-          <a:p>
-            <a:pPr marL="171450" indent="-171450">
+              <a:rPr lang="en-US" baseline="0" dirty="0" smtClean="0"/>
+              <a:t>Filter</a:t>
+            </a:r>
+          </a:p>
+          <a:p>
+            <a:pPr marL="171450" lvl="0" indent="-171450">
               <a:buFont typeface="Arial"/>
               <a:buChar char="•"/>
             </a:pPr>
             <a:r>
-              <a:rPr lang="en-US" dirty="0" smtClean="0"/>
-              <a:t>Labels</a:t>
-            </a:r>
-          </a:p>
-          <a:p>
-            <a:pPr marL="171450" indent="-171450">
+              <a:rPr lang="en-US" baseline="0" dirty="0" smtClean="0"/>
+              <a:t>Split</a:t>
+            </a:r>
+          </a:p>
+          <a:p>
+            <a:pPr marL="171450" lvl="0" indent="-171450">
               <a:buFont typeface="Arial"/>
               <a:buChar char="•"/>
             </a:pPr>
             <a:r>
+              <a:rPr lang="en-US" baseline="0" dirty="0" smtClean="0"/>
+              <a:t>Route </a:t>
+            </a:r>
+            <a:endParaRPr lang="en-US" dirty="0" smtClean="0"/>
+          </a:p>
+          <a:p>
+            <a:r>
               <a:rPr lang="en-US" dirty="0" smtClean="0"/>
-              <a:t>Demo</a:t>
-            </a:r>
-          </a:p>
-          <a:p>
-            <a:pPr marL="171450" indent="-171450">
-              <a:buFont typeface="Arial"/>
-              <a:buChar char="•"/>
-            </a:pPr>
+              <a:t>Image </a:t>
+            </a:r>
             <a:r>
               <a:rPr lang="en-US" dirty="0" smtClean="0"/>
-              <a:t>Destinations </a:t>
-            </a:r>
-          </a:p>
-          <a:p>
-            <a:pPr marL="171450" indent="-171450">
-              <a:buFont typeface="Arial"/>
-              <a:buChar char="•"/>
-            </a:pPr>
+              <a:t>by: https://</a:t>
+            </a:r>
+            <a:r>
+              <a:rPr lang="en-US" dirty="0" err="1" smtClean="0"/>
+              <a:t>flic.kr</a:t>
+            </a:r>
             <a:r>
               <a:rPr lang="en-US" dirty="0" smtClean="0"/>
-              <a:t>Destination to sink</a:t>
-            </a:r>
-          </a:p>
-          <a:p>
-            <a:pPr marL="171450" indent="-171450">
-              <a:buFont typeface="Arial"/>
-              <a:buChar char="•"/>
-            </a:pPr>
-            <a:r>
-              <a:rPr lang="en-US" dirty="0" smtClean="0"/>
-              <a:t>Source to Destination</a:t>
-            </a:r>
-          </a:p>
-          <a:p>
-            <a:pPr marL="171450" indent="-171450">
-              <a:buFont typeface="Arial"/>
-              <a:buChar char="•"/>
-            </a:pPr>
-            <a:r>
-              <a:rPr lang="en-US" dirty="0" smtClean="0"/>
-              <a:t>Connect 2 destinations</a:t>
+              <a:t>/p/78gaTX</a:t>
             </a:r>
             <a:endParaRPr lang="en-US" dirty="0"/>
           </a:p>
@@ -1319,7 +2203,7 @@
           <a:p>
             <a:fld id="{F8391148-97EC-CA49-B378-21F69A05E275}" type="slidenum">
               <a:rPr lang="en-US" smtClean="0"/>
-              <a:t>15</a:t>
+              <a:t>7</a:t>
             </a:fld>
             <a:endParaRPr lang="en-US"/>
           </a:p>
@@ -1328,7 +2212,7 @@
     </p:spTree>
     <p:extLst>
       <p:ext uri="{BB962C8B-B14F-4D97-AF65-F5344CB8AC3E}">
-        <p14:creationId xmlns:p14="http://schemas.microsoft.com/office/powerpoint/2010/main" val="872856952"/>
+        <p14:creationId xmlns:p14="http://schemas.microsoft.com/office/powerpoint/2010/main" val="1373570517"/>
       </p:ext>
     </p:extLst>
   </p:cSld>
@@ -1382,9 +2266,151 @@
           <a:bodyPr/>
           <a:lstStyle/>
           <a:p>
+            <a:pPr marL="171450" indent="-171450">
+              <a:buFont typeface="Arial"/>
+              <a:buChar char="•"/>
+            </a:pPr>
             <a:r>
               <a:rPr lang="en-US" dirty="0" smtClean="0"/>
-              <a:t>Need Demo</a:t>
+              <a:t>Stream</a:t>
+            </a:r>
+            <a:r>
+              <a:rPr lang="en-US" baseline="0" dirty="0" smtClean="0"/>
+              <a:t> create </a:t>
+            </a:r>
+            <a:r>
+              <a:rPr lang="en-US" baseline="0" dirty="0" err="1" smtClean="0"/>
+              <a:t>xform</a:t>
+            </a:r>
+            <a:r>
+              <a:rPr lang="en-US" baseline="0" dirty="0" smtClean="0"/>
+              <a:t> </a:t>
+            </a:r>
+            <a:r>
+              <a:rPr lang="mr-IN" baseline="0" dirty="0" smtClean="0"/>
+              <a:t>–</a:t>
+            </a:r>
+            <a:r>
+              <a:rPr lang="en-US" baseline="0" dirty="0" smtClean="0"/>
+              <a:t>definition “http | transform </a:t>
+            </a:r>
+            <a:r>
+              <a:rPr lang="mr-IN" baseline="0" dirty="0" smtClean="0"/>
+              <a:t>–</a:t>
+            </a:r>
+            <a:r>
+              <a:rPr lang="en-US" baseline="0" dirty="0" smtClean="0"/>
+              <a:t>expression=</a:t>
+            </a:r>
+            <a:r>
+              <a:rPr lang="en-US" baseline="0" dirty="0" err="1" smtClean="0"/>
+              <a:t>payload.toUpperCase</a:t>
+            </a:r>
+            <a:r>
+              <a:rPr lang="en-US" baseline="0" dirty="0" smtClean="0"/>
+              <a:t>() | log”  --deploy</a:t>
+            </a:r>
+          </a:p>
+          <a:p>
+            <a:pPr marL="171450" marR="0" indent="-171450" algn="l" defTabSz="457200" rtl="0" eaLnBrk="1" fontAlgn="auto" latinLnBrk="0" hangingPunct="1">
+              <a:lnSpc>
+                <a:spcPct val="100000"/>
+              </a:lnSpc>
+              <a:spcBef>
+                <a:spcPts val="0"/>
+              </a:spcBef>
+              <a:spcAft>
+                <a:spcPts val="0"/>
+              </a:spcAft>
+              <a:buClrTx/>
+              <a:buSzTx/>
+              <a:buFont typeface="Arial"/>
+              <a:buChar char="•"/>
+              <a:tabLst/>
+              <a:defRPr/>
+            </a:pPr>
+            <a:r>
+              <a:rPr lang="en-US" baseline="0" dirty="0" smtClean="0"/>
+              <a:t>Stream </a:t>
+            </a:r>
+            <a:r>
+              <a:rPr lang="en-US" baseline="0" dirty="0" smtClean="0"/>
+              <a:t>create </a:t>
+            </a:r>
+            <a:r>
+              <a:rPr lang="en-US" baseline="0" dirty="0" err="1" smtClean="0"/>
+              <a:t>xform</a:t>
+            </a:r>
+            <a:r>
+              <a:rPr lang="en-US" baseline="0" dirty="0" smtClean="0"/>
+              <a:t> </a:t>
+            </a:r>
+            <a:r>
+              <a:rPr lang="mr-IN" baseline="0" dirty="0" smtClean="0"/>
+              <a:t>–</a:t>
+            </a:r>
+            <a:r>
+              <a:rPr lang="en-US" baseline="0" dirty="0" smtClean="0"/>
+              <a:t>definition “http |filter </a:t>
+            </a:r>
+            <a:r>
+              <a:rPr lang="mr-IN" baseline="0" dirty="0" smtClean="0"/>
+              <a:t>–</a:t>
+            </a:r>
+            <a:r>
+              <a:rPr lang="en-US" baseline="0" dirty="0" smtClean="0"/>
+              <a:t>expression=</a:t>
+            </a:r>
+            <a:r>
+              <a:rPr lang="en-US" baseline="0" dirty="0" err="1" smtClean="0"/>
+              <a:t>payload.contains</a:t>
+            </a:r>
+            <a:r>
+              <a:rPr lang="en-US" baseline="0" dirty="0" smtClean="0"/>
+              <a:t>(‘hello’) | transform </a:t>
+            </a:r>
+            <a:r>
+              <a:rPr lang="mr-IN" baseline="0" dirty="0" smtClean="0"/>
+              <a:t>–</a:t>
+            </a:r>
+            <a:r>
+              <a:rPr lang="en-US" baseline="0" dirty="0" smtClean="0"/>
+              <a:t>expression=</a:t>
+            </a:r>
+            <a:r>
+              <a:rPr lang="en-US" baseline="0" dirty="0" err="1" smtClean="0"/>
+              <a:t>payload.toUpperCase</a:t>
+            </a:r>
+            <a:r>
+              <a:rPr lang="en-US" baseline="0" dirty="0" smtClean="0"/>
+              <a:t>() | log”  --deploy</a:t>
+            </a:r>
+          </a:p>
+          <a:p>
+            <a:pPr marL="171450" indent="-171450">
+              <a:buFont typeface="Arial"/>
+              <a:buChar char="•"/>
+            </a:pPr>
+            <a:endParaRPr lang="en-US" dirty="0" smtClean="0"/>
+          </a:p>
+          <a:p>
+            <a:endParaRPr lang="en-US" dirty="0" smtClean="0"/>
+          </a:p>
+          <a:p>
+            <a:endParaRPr lang="en-US" dirty="0" smtClean="0"/>
+          </a:p>
+          <a:p>
+            <a:r>
+              <a:rPr lang="en-US" dirty="0" smtClean="0"/>
+              <a:t>Image: https://</a:t>
+            </a:r>
+            <a:r>
+              <a:rPr lang="en-US" dirty="0" err="1" smtClean="0"/>
+              <a:t>flic.kr</a:t>
+            </a:r>
+            <a:r>
+              <a:rPr lang="en-US" dirty="0" smtClean="0"/>
+              <a:t>/p/q6YRM8</a:t>
             </a:r>
             <a:endParaRPr lang="en-US" dirty="0"/>
           </a:p>
@@ -1407,7 +2433,7 @@
           <a:p>
             <a:fld id="{F8391148-97EC-CA49-B378-21F69A05E275}" type="slidenum">
               <a:rPr lang="en-US" smtClean="0"/>
-              <a:t>17</a:t>
+              <a:t>8</a:t>
             </a:fld>
             <a:endParaRPr lang="en-US"/>
           </a:p>
@@ -1416,7 +2442,174 @@
     </p:spTree>
     <p:extLst>
       <p:ext uri="{BB962C8B-B14F-4D97-AF65-F5344CB8AC3E}">
-        <p14:creationId xmlns:p14="http://schemas.microsoft.com/office/powerpoint/2010/main" val="3233900271"/>
+        <p14:creationId xmlns:p14="http://schemas.microsoft.com/office/powerpoint/2010/main" val="1043243537"/>
+      </p:ext>
+    </p:extLst>
+  </p:cSld>
+  <p:clrMapOvr>
+    <a:masterClrMapping/>
+  </p:clrMapOvr>
+</p:notes>
+</file>
+
+<file path=ppt/notesSlides/notesSlide9.xml><?xml version="1.0" encoding="utf-8"?>
+<p:notes xmlns:a="http://schemas.openxmlformats.org/drawingml/2006/main" xmlns:r="http://schemas.openxmlformats.org/officeDocument/2006/relationships" xmlns:p="http://schemas.openxmlformats.org/presentationml/2006/main">
+  <p:cSld>
+    <p:spTree>
+      <p:nvGrpSpPr>
+        <p:cNvPr id="1" name=""/>
+        <p:cNvGrpSpPr/>
+        <p:nvPr/>
+      </p:nvGrpSpPr>
+      <p:grpSpPr>
+        <a:xfrm>
+          <a:off x="0" y="0"/>
+          <a:ext cx="0" cy="0"/>
+          <a:chOff x="0" y="0"/>
+          <a:chExt cx="0" cy="0"/>
+        </a:xfrm>
+      </p:grpSpPr>
+      <p:sp>
+        <p:nvSpPr>
+          <p:cNvPr id="2" name="Slide Image Placeholder 1"/>
+          <p:cNvSpPr>
+            <a:spLocks noGrp="1" noRot="1" noChangeAspect="1"/>
+          </p:cNvSpPr>
+          <p:nvPr>
+            <p:ph type="sldImg"/>
+          </p:nvPr>
+        </p:nvSpPr>
+        <p:spPr/>
+      </p:sp>
+      <p:sp>
+        <p:nvSpPr>
+          <p:cNvPr id="3" name="Notes Placeholder 2"/>
+          <p:cNvSpPr>
+            <a:spLocks noGrp="1"/>
+          </p:cNvSpPr>
+          <p:nvPr>
+            <p:ph type="body" idx="1"/>
+          </p:nvPr>
+        </p:nvSpPr>
+        <p:spPr/>
+        <p:txBody>
+          <a:bodyPr/>
+          <a:lstStyle/>
+          <a:p>
+            <a:pPr marL="171450" indent="-171450">
+              <a:buFont typeface="Arial"/>
+              <a:buChar char="•"/>
+            </a:pPr>
+            <a:r>
+              <a:rPr lang="en-US" dirty="0" smtClean="0"/>
+              <a:t>And a part of spring boot is the ability</a:t>
+            </a:r>
+            <a:r>
+              <a:rPr lang="en-US" baseline="0" dirty="0" smtClean="0"/>
+              <a:t> to retrieve properties from the environment, command-line etc.  </a:t>
+            </a:r>
+            <a:endParaRPr lang="en-US" dirty="0" smtClean="0"/>
+          </a:p>
+          <a:p>
+            <a:pPr marL="171450" indent="-171450">
+              <a:buFont typeface="Arial"/>
+              <a:buChar char="•"/>
+            </a:pPr>
+            <a:r>
+              <a:rPr lang="en-US" dirty="0" smtClean="0"/>
+              <a:t>These properties can be set at stream definition creation Each app is configurable via </a:t>
+            </a:r>
+            <a:r>
+              <a:rPr lang="mr-IN" dirty="0" smtClean="0"/>
+              <a:t>–</a:t>
+            </a:r>
+            <a:r>
+              <a:rPr lang="en-US" dirty="0" smtClean="0"/>
+              <a:t>properties</a:t>
+            </a:r>
+          </a:p>
+          <a:p>
+            <a:pPr marL="171450" indent="-171450">
+              <a:buFont typeface="Arial"/>
+              <a:buChar char="•"/>
+            </a:pPr>
+            <a:r>
+              <a:rPr lang="en-US" dirty="0" smtClean="0"/>
+              <a:t>UI</a:t>
+            </a:r>
+            <a:r>
+              <a:rPr lang="en-US" baseline="0" dirty="0" smtClean="0"/>
+              <a:t> will show options</a:t>
+            </a:r>
+          </a:p>
+          <a:p>
+            <a:pPr marL="171450" indent="-171450">
+              <a:buFont typeface="Arial"/>
+              <a:buChar char="•"/>
+            </a:pPr>
+            <a:r>
+              <a:rPr lang="en-US" baseline="0" dirty="0" smtClean="0"/>
+              <a:t>Shell has auto complete and the ability to see properties through the `app info source:&lt;name of app&gt;</a:t>
+            </a:r>
+            <a:endParaRPr lang="en-US" dirty="0" smtClean="0"/>
+          </a:p>
+          <a:p>
+            <a:pPr marL="171450" indent="-171450">
+              <a:buFont typeface="Arial"/>
+              <a:buChar char="•"/>
+            </a:pPr>
+            <a:r>
+              <a:rPr lang="en-US" dirty="0" smtClean="0"/>
+              <a:t>*Demo*</a:t>
+            </a:r>
+          </a:p>
+          <a:p>
+            <a:pPr marL="171450" indent="-171450">
+              <a:buFont typeface="Arial"/>
+              <a:buChar char="•"/>
+            </a:pPr>
+            <a:r>
+              <a:rPr lang="en-US" dirty="0" smtClean="0"/>
+              <a:t>You can use the --</a:t>
+            </a:r>
+            <a:r>
+              <a:rPr lang="en-US" dirty="0" err="1" smtClean="0"/>
+              <a:t>propertiesFile</a:t>
+            </a:r>
+            <a:endParaRPr lang="en-US" dirty="0" smtClean="0"/>
+          </a:p>
+          <a:p>
+            <a:endParaRPr lang="en-US" dirty="0"/>
+          </a:p>
+        </p:txBody>
+      </p:sp>
+      <p:sp>
+        <p:nvSpPr>
+          <p:cNvPr id="4" name="Slide Number Placeholder 3"/>
+          <p:cNvSpPr>
+            <a:spLocks noGrp="1"/>
+          </p:cNvSpPr>
+          <p:nvPr>
+            <p:ph type="sldNum" sz="quarter" idx="10"/>
+          </p:nvPr>
+        </p:nvSpPr>
+        <p:spPr/>
+        <p:txBody>
+          <a:bodyPr/>
+          <a:lstStyle/>
+          <a:p>
+            <a:fld id="{F8391148-97EC-CA49-B378-21F69A05E275}" type="slidenum">
+              <a:rPr lang="en-US" smtClean="0"/>
+              <a:t>9</a:t>
+            </a:fld>
+            <a:endParaRPr lang="en-US"/>
+          </a:p>
+        </p:txBody>
+      </p:sp>
+    </p:spTree>
+    <p:extLst>
+      <p:ext uri="{BB962C8B-B14F-4D97-AF65-F5344CB8AC3E}">
+        <p14:creationId xmlns:p14="http://schemas.microsoft.com/office/powerpoint/2010/main" val="2458878901"/>
       </p:ext>
     </p:extLst>
   </p:cSld>
@@ -1607,7 +2800,7 @@
           <a:p>
             <a:fld id="{8CBACE14-24CC-7E4F-864F-685115364BA3}" type="datetimeFigureOut">
               <a:rPr lang="en-US" smtClean="0"/>
-              <a:t>1/2/17</a:t>
+              <a:t>1/8/17</a:t>
             </a:fld>
             <a:endParaRPr lang="en-US"/>
           </a:p>
@@ -1777,7 +2970,7 @@
           <a:p>
             <a:fld id="{8CBACE14-24CC-7E4F-864F-685115364BA3}" type="datetimeFigureOut">
               <a:rPr lang="en-US" smtClean="0"/>
-              <a:t>1/2/17</a:t>
+              <a:t>1/8/17</a:t>
             </a:fld>
             <a:endParaRPr lang="en-US"/>
           </a:p>
@@ -1957,7 +3150,7 @@
           <a:p>
             <a:fld id="{8CBACE14-24CC-7E4F-864F-685115364BA3}" type="datetimeFigureOut">
               <a:rPr lang="en-US" smtClean="0"/>
-              <a:t>1/2/17</a:t>
+              <a:t>1/8/17</a:t>
             </a:fld>
             <a:endParaRPr lang="en-US"/>
           </a:p>
@@ -2127,7 +3320,7 @@
           <a:p>
             <a:fld id="{8CBACE14-24CC-7E4F-864F-685115364BA3}" type="datetimeFigureOut">
               <a:rPr lang="en-US" smtClean="0"/>
-              <a:t>1/2/17</a:t>
+              <a:t>1/8/17</a:t>
             </a:fld>
             <a:endParaRPr lang="en-US"/>
           </a:p>
@@ -2373,7 +3566,7 @@
           <a:p>
             <a:fld id="{8CBACE14-24CC-7E4F-864F-685115364BA3}" type="datetimeFigureOut">
               <a:rPr lang="en-US" smtClean="0"/>
-              <a:t>1/2/17</a:t>
+              <a:t>1/8/17</a:t>
             </a:fld>
             <a:endParaRPr lang="en-US"/>
           </a:p>
@@ -2661,7 +3854,7 @@
           <a:p>
             <a:fld id="{8CBACE14-24CC-7E4F-864F-685115364BA3}" type="datetimeFigureOut">
               <a:rPr lang="en-US" smtClean="0"/>
-              <a:t>1/2/17</a:t>
+              <a:t>1/8/17</a:t>
             </a:fld>
             <a:endParaRPr lang="en-US"/>
           </a:p>
@@ -3083,7 +4276,7 @@
           <a:p>
             <a:fld id="{8CBACE14-24CC-7E4F-864F-685115364BA3}" type="datetimeFigureOut">
               <a:rPr lang="en-US" smtClean="0"/>
-              <a:t>1/2/17</a:t>
+              <a:t>1/8/17</a:t>
             </a:fld>
             <a:endParaRPr lang="en-US"/>
           </a:p>
@@ -3201,7 +4394,7 @@
           <a:p>
             <a:fld id="{8CBACE14-24CC-7E4F-864F-685115364BA3}" type="datetimeFigureOut">
               <a:rPr lang="en-US" smtClean="0"/>
-              <a:t>1/2/17</a:t>
+              <a:t>1/8/17</a:t>
             </a:fld>
             <a:endParaRPr lang="en-US"/>
           </a:p>
@@ -3296,7 +4489,7 @@
           <a:p>
             <a:fld id="{8CBACE14-24CC-7E4F-864F-685115364BA3}" type="datetimeFigureOut">
               <a:rPr lang="en-US" smtClean="0"/>
-              <a:t>1/2/17</a:t>
+              <a:t>1/8/17</a:t>
             </a:fld>
             <a:endParaRPr lang="en-US"/>
           </a:p>
@@ -3573,7 +4766,7 @@
           <a:p>
             <a:fld id="{8CBACE14-24CC-7E4F-864F-685115364BA3}" type="datetimeFigureOut">
               <a:rPr lang="en-US" smtClean="0"/>
-              <a:t>1/2/17</a:t>
+              <a:t>1/8/17</a:t>
             </a:fld>
             <a:endParaRPr lang="en-US"/>
           </a:p>
@@ -3826,7 +5019,7 @@
           <a:p>
             <a:fld id="{8CBACE14-24CC-7E4F-864F-685115364BA3}" type="datetimeFigureOut">
               <a:rPr lang="en-US" smtClean="0"/>
-              <a:t>1/2/17</a:t>
+              <a:t>1/8/17</a:t>
             </a:fld>
             <a:endParaRPr lang="en-US"/>
           </a:p>
@@ -4039,7 +5232,7 @@
           <a:p>
             <a:fld id="{8CBACE14-24CC-7E4F-864F-685115364BA3}" type="datetimeFigureOut">
               <a:rPr lang="en-US" smtClean="0"/>
-              <a:t>1/2/17</a:t>
+              <a:t>1/8/17</a:t>
             </a:fld>
             <a:endParaRPr lang="en-US"/>
           </a:p>
@@ -4403,8 +5596,8 @@
     <p:bg>
       <p:bgPr>
         <a:blipFill rotWithShape="1">
-          <a:blip r:embed="rId2">
-            <a:alphaModFix amt="35000"/>
+          <a:blip r:embed="rId3">
+            <a:alphaModFix amt="41000"/>
           </a:blip>
           <a:stretch>
             <a:fillRect/>
@@ -4560,7 +5753,7 @@
           <a:p>
             <a:r>
               <a:rPr lang="en-US" dirty="0" smtClean="0"/>
-              <a:t>Deployed</a:t>
+              <a:t>Deploying</a:t>
             </a:r>
             <a:endParaRPr lang="en-US" dirty="0"/>
           </a:p>
@@ -4588,7 +5781,7 @@
     </p:spTree>
     <p:extLst>
       <p:ext uri="{BB962C8B-B14F-4D97-AF65-F5344CB8AC3E}">
-        <p14:creationId xmlns:p14="http://schemas.microsoft.com/office/powerpoint/2010/main" val="4223267745"/>
+        <p14:creationId xmlns:p14="http://schemas.microsoft.com/office/powerpoint/2010/main" val="466818822"/>
       </p:ext>
     </p:extLst>
   </p:cSld>
@@ -4632,7 +5825,7 @@
           <a:p>
             <a:r>
               <a:rPr lang="en-US" dirty="0" smtClean="0"/>
-              <a:t>Incomplete</a:t>
+              <a:t>Deployed</a:t>
             </a:r>
             <a:endParaRPr lang="en-US" dirty="0"/>
           </a:p>
@@ -4660,7 +5853,7 @@
     </p:spTree>
     <p:extLst>
       <p:ext uri="{BB962C8B-B14F-4D97-AF65-F5344CB8AC3E}">
-        <p14:creationId xmlns:p14="http://schemas.microsoft.com/office/powerpoint/2010/main" val="787565429"/>
+        <p14:creationId xmlns:p14="http://schemas.microsoft.com/office/powerpoint/2010/main" val="4223267745"/>
       </p:ext>
     </p:extLst>
   </p:cSld>
@@ -4699,14 +5892,12 @@
         </p:nvSpPr>
         <p:spPr/>
         <p:txBody>
-          <a:bodyPr>
-            <a:normAutofit/>
-          </a:bodyPr>
+          <a:bodyPr/>
           <a:lstStyle/>
           <a:p>
             <a:r>
               <a:rPr lang="en-US" dirty="0" smtClean="0"/>
-              <a:t>Failed</a:t>
+              <a:t>Incomplete</a:t>
             </a:r>
             <a:endParaRPr lang="en-US" dirty="0"/>
           </a:p>
@@ -4734,7 +5925,7 @@
     </p:spTree>
     <p:extLst>
       <p:ext uri="{BB962C8B-B14F-4D97-AF65-F5344CB8AC3E}">
-        <p14:creationId xmlns:p14="http://schemas.microsoft.com/office/powerpoint/2010/main" val="2550965696"/>
+        <p14:creationId xmlns:p14="http://schemas.microsoft.com/office/powerpoint/2010/main" val="787565429"/>
       </p:ext>
     </p:extLst>
   </p:cSld>
@@ -4773,12 +5964,14 @@
         </p:nvSpPr>
         <p:spPr/>
         <p:txBody>
-          <a:bodyPr/>
-          <a:lstStyle/>
-          <a:p>
-            <a:r>
-              <a:rPr lang="en-US" dirty="0" err="1" smtClean="0"/>
-              <a:t>Undeployed</a:t>
+          <a:bodyPr>
+            <a:normAutofit/>
+          </a:bodyPr>
+          <a:lstStyle/>
+          <a:p>
+            <a:r>
+              <a:rPr lang="en-US" dirty="0" smtClean="0"/>
+              <a:t>Failed</a:t>
             </a:r>
             <a:endParaRPr lang="en-US" dirty="0"/>
           </a:p>
@@ -4806,7 +5999,7 @@
     </p:spTree>
     <p:extLst>
       <p:ext uri="{BB962C8B-B14F-4D97-AF65-F5344CB8AC3E}">
-        <p14:creationId xmlns:p14="http://schemas.microsoft.com/office/powerpoint/2010/main" val="3367756373"/>
+        <p14:creationId xmlns:p14="http://schemas.microsoft.com/office/powerpoint/2010/main" val="2550965696"/>
       </p:ext>
     </p:extLst>
   </p:cSld>
@@ -4849,8 +6042,8 @@
           <a:lstStyle/>
           <a:p>
             <a:r>
-              <a:rPr lang="en-US" dirty="0" smtClean="0"/>
-              <a:t>The “|” Symbol</a:t>
+              <a:rPr lang="en-US" dirty="0" err="1" smtClean="0"/>
+              <a:t>Undeployed</a:t>
             </a:r>
             <a:endParaRPr lang="en-US" dirty="0"/>
           </a:p>
@@ -4878,7 +6071,7 @@
     </p:spTree>
     <p:extLst>
       <p:ext uri="{BB962C8B-B14F-4D97-AF65-F5344CB8AC3E}">
-        <p14:creationId xmlns:p14="http://schemas.microsoft.com/office/powerpoint/2010/main" val="1629751173"/>
+        <p14:creationId xmlns:p14="http://schemas.microsoft.com/office/powerpoint/2010/main" val="3367756373"/>
       </p:ext>
     </p:extLst>
   </p:cSld>
@@ -4922,7 +6115,7 @@
           <a:p>
             <a:r>
               <a:rPr lang="en-US" dirty="0" smtClean="0"/>
-              <a:t>The “&gt;” Symbol</a:t>
+              <a:t>The “|” Symbol</a:t>
             </a:r>
             <a:endParaRPr lang="en-US" dirty="0"/>
           </a:p>
@@ -4943,14 +6136,14 @@
           <a:bodyPr/>
           <a:lstStyle/>
           <a:p>
-            <a:endParaRPr lang="en-US" dirty="0"/>
+            <a:endParaRPr lang="en-US"/>
           </a:p>
         </p:txBody>
       </p:sp>
     </p:spTree>
     <p:extLst>
       <p:ext uri="{BB962C8B-B14F-4D97-AF65-F5344CB8AC3E}">
-        <p14:creationId xmlns:p14="http://schemas.microsoft.com/office/powerpoint/2010/main" val="2422731334"/>
+        <p14:creationId xmlns:p14="http://schemas.microsoft.com/office/powerpoint/2010/main" val="1629751173"/>
       </p:ext>
     </p:extLst>
   </p:cSld>
@@ -4994,7 +6187,7 @@
           <a:p>
             <a:r>
               <a:rPr lang="en-US" dirty="0" smtClean="0"/>
-              <a:t>Grouping</a:t>
+              <a:t>The “&gt;” Symbol</a:t>
             </a:r>
             <a:endParaRPr lang="en-US" dirty="0"/>
           </a:p>
@@ -5015,14 +6208,14 @@
           <a:bodyPr/>
           <a:lstStyle/>
           <a:p>
-            <a:endParaRPr lang="en-US"/>
+            <a:endParaRPr lang="en-US" dirty="0"/>
           </a:p>
         </p:txBody>
       </p:sp>
     </p:spTree>
     <p:extLst>
       <p:ext uri="{BB962C8B-B14F-4D97-AF65-F5344CB8AC3E}">
-        <p14:creationId xmlns:p14="http://schemas.microsoft.com/office/powerpoint/2010/main" val="2694468309"/>
+        <p14:creationId xmlns:p14="http://schemas.microsoft.com/office/powerpoint/2010/main" val="2422731334"/>
       </p:ext>
     </p:extLst>
   </p:cSld>
@@ -5066,35 +6259,16 @@
           <a:p>
             <a:r>
               <a:rPr lang="en-US" dirty="0" smtClean="0"/>
-              <a:t>Partitioning</a:t>
+              <a:t>Directed Graph</a:t>
             </a:r>
             <a:endParaRPr lang="en-US" dirty="0"/>
-          </a:p>
-        </p:txBody>
-      </p:sp>
-      <p:sp>
-        <p:nvSpPr>
-          <p:cNvPr id="3" name="Content Placeholder 2"/>
-          <p:cNvSpPr>
-            <a:spLocks noGrp="1"/>
-          </p:cNvSpPr>
-          <p:nvPr>
-            <p:ph idx="1"/>
-          </p:nvPr>
-        </p:nvSpPr>
-        <p:spPr/>
-        <p:txBody>
-          <a:bodyPr/>
-          <a:lstStyle/>
-          <a:p>
-            <a:endParaRPr lang="en-US"/>
           </a:p>
         </p:txBody>
       </p:sp>
     </p:spTree>
     <p:extLst>
       <p:ext uri="{BB962C8B-B14F-4D97-AF65-F5344CB8AC3E}">
-        <p14:creationId xmlns:p14="http://schemas.microsoft.com/office/powerpoint/2010/main" val="65931306"/>
+        <p14:creationId xmlns:p14="http://schemas.microsoft.com/office/powerpoint/2010/main" val="4091544076"/>
       </p:ext>
     </p:extLst>
   </p:cSld>
@@ -5138,7 +6312,7 @@
           <a:p>
             <a:r>
               <a:rPr lang="en-US" dirty="0" smtClean="0"/>
-              <a:t>Reactive</a:t>
+              <a:t>Grouping</a:t>
             </a:r>
             <a:endParaRPr lang="en-US" dirty="0"/>
           </a:p>
@@ -5166,7 +6340,79 @@
     </p:spTree>
     <p:extLst>
       <p:ext uri="{BB962C8B-B14F-4D97-AF65-F5344CB8AC3E}">
-        <p14:creationId xmlns:p14="http://schemas.microsoft.com/office/powerpoint/2010/main" val="2002376262"/>
+        <p14:creationId xmlns:p14="http://schemas.microsoft.com/office/powerpoint/2010/main" val="2694468309"/>
+      </p:ext>
+    </p:extLst>
+  </p:cSld>
+  <p:clrMapOvr>
+    <a:masterClrMapping/>
+  </p:clrMapOvr>
+</p:sld>
+</file>
+
+<file path=ppt/slides/slide19.xml><?xml version="1.0" encoding="utf-8"?>
+<p:sld xmlns:a="http://schemas.openxmlformats.org/drawingml/2006/main" xmlns:r="http://schemas.openxmlformats.org/officeDocument/2006/relationships" xmlns:p="http://schemas.openxmlformats.org/presentationml/2006/main">
+  <p:cSld>
+    <p:spTree>
+      <p:nvGrpSpPr>
+        <p:cNvPr id="1" name=""/>
+        <p:cNvGrpSpPr/>
+        <p:nvPr/>
+      </p:nvGrpSpPr>
+      <p:grpSpPr>
+        <a:xfrm>
+          <a:off x="0" y="0"/>
+          <a:ext cx="0" cy="0"/>
+          <a:chOff x="0" y="0"/>
+          <a:chExt cx="0" cy="0"/>
+        </a:xfrm>
+      </p:grpSpPr>
+      <p:sp>
+        <p:nvSpPr>
+          <p:cNvPr id="2" name="Title 1"/>
+          <p:cNvSpPr>
+            <a:spLocks noGrp="1"/>
+          </p:cNvSpPr>
+          <p:nvPr>
+            <p:ph type="title"/>
+          </p:nvPr>
+        </p:nvSpPr>
+        <p:spPr/>
+        <p:txBody>
+          <a:bodyPr/>
+          <a:lstStyle/>
+          <a:p>
+            <a:r>
+              <a:rPr lang="en-US" dirty="0" smtClean="0"/>
+              <a:t>Partitioning</a:t>
+            </a:r>
+            <a:endParaRPr lang="en-US" dirty="0"/>
+          </a:p>
+        </p:txBody>
+      </p:sp>
+      <p:sp>
+        <p:nvSpPr>
+          <p:cNvPr id="3" name="Content Placeholder 2"/>
+          <p:cNvSpPr>
+            <a:spLocks noGrp="1"/>
+          </p:cNvSpPr>
+          <p:nvPr>
+            <p:ph idx="1"/>
+          </p:nvPr>
+        </p:nvSpPr>
+        <p:spPr/>
+        <p:txBody>
+          <a:bodyPr/>
+          <a:lstStyle/>
+          <a:p>
+            <a:endParaRPr lang="en-US"/>
+          </a:p>
+        </p:txBody>
+      </p:sp>
+    </p:spTree>
+    <p:extLst>
+      <p:ext uri="{BB962C8B-B14F-4D97-AF65-F5344CB8AC3E}">
+        <p14:creationId xmlns:p14="http://schemas.microsoft.com/office/powerpoint/2010/main" val="65931306"/>
       </p:ext>
     </p:extLst>
   </p:cSld>
@@ -5181,9 +6427,14 @@
   <p:cSld>
     <p:bg>
       <p:bgPr>
-        <a:solidFill>
-          <a:schemeClr val="tx1"/>
-        </a:solidFill>
+        <a:blipFill rotWithShape="1">
+          <a:blip r:embed="rId3">
+            <a:alphaModFix amt="40000"/>
+          </a:blip>
+          <a:stretch>
+            <a:fillRect/>
+          </a:stretch>
+        </a:blipFill>
         <a:effectLst/>
       </p:bgPr>
     </p:bg>
@@ -5201,6 +6452,287 @@
           <a:chExt cx="0" cy="0"/>
         </a:xfrm>
       </p:grpSpPr>
+      <p:pic>
+        <p:nvPicPr>
+          <p:cNvPr id="6" name="Picture 5" descr="images.png"/>
+          <p:cNvPicPr>
+            <a:picLocks noChangeAspect="1"/>
+          </p:cNvPicPr>
+          <p:nvPr/>
+        </p:nvPicPr>
+        <p:blipFill>
+          <a:blip r:embed="rId4">
+            <a:extLst>
+              <a:ext uri="{28A0092B-C50C-407E-A947-70E740481C1C}">
+                <a14:useLocalDpi xmlns:a14="http://schemas.microsoft.com/office/drawing/2010/main" val="0"/>
+              </a:ext>
+            </a:extLst>
+          </a:blip>
+          <a:stretch>
+            <a:fillRect/>
+          </a:stretch>
+        </p:blipFill>
+        <p:spPr>
+          <a:xfrm>
+            <a:off x="68006" y="1927399"/>
+            <a:ext cx="1854200" cy="1854200"/>
+          </a:xfrm>
+          <a:prstGeom prst="rect">
+            <a:avLst/>
+          </a:prstGeom>
+        </p:spPr>
+      </p:pic>
+      <p:pic>
+        <p:nvPicPr>
+          <p:cNvPr id="7" name="Picture 6" descr="logo-spring.jpg"/>
+          <p:cNvPicPr>
+            <a:picLocks noChangeAspect="1"/>
+          </p:cNvPicPr>
+          <p:nvPr/>
+        </p:nvPicPr>
+        <p:blipFill>
+          <a:blip r:embed="rId5">
+            <a:extLst>
+              <a:ext uri="{28A0092B-C50C-407E-A947-70E740481C1C}">
+                <a14:useLocalDpi xmlns:a14="http://schemas.microsoft.com/office/drawing/2010/main" val="0"/>
+              </a:ext>
+            </a:extLst>
+          </a:blip>
+          <a:stretch>
+            <a:fillRect/>
+          </a:stretch>
+        </p:blipFill>
+        <p:spPr>
+          <a:xfrm>
+            <a:off x="3455077" y="1927399"/>
+            <a:ext cx="1854200" cy="1854200"/>
+          </a:xfrm>
+          <a:prstGeom prst="rect">
+            <a:avLst/>
+          </a:prstGeom>
+        </p:spPr>
+      </p:pic>
+      <p:sp>
+        <p:nvSpPr>
+          <p:cNvPr id="8" name="TextBox 7"/>
+          <p:cNvSpPr txBox="1"/>
+          <p:nvPr/>
+        </p:nvSpPr>
+        <p:spPr>
+          <a:xfrm>
+            <a:off x="2238979" y="1704800"/>
+            <a:ext cx="951102" cy="1938992"/>
+          </a:xfrm>
+          <a:prstGeom prst="rect">
+            <a:avLst/>
+          </a:prstGeom>
+          <a:noFill/>
+        </p:spPr>
+        <p:txBody>
+          <a:bodyPr wrap="none" rtlCol="0">
+            <a:spAutoFit/>
+          </a:bodyPr>
+          <a:lstStyle/>
+          <a:p>
+            <a:r>
+              <a:rPr lang="en-US" sz="12000" dirty="0" smtClean="0">
+                <a:solidFill>
+                  <a:srgbClr val="008000"/>
+                </a:solidFill>
+              </a:rPr>
+              <a:t>+</a:t>
+            </a:r>
+            <a:endParaRPr lang="en-US" sz="12000" dirty="0">
+              <a:solidFill>
+                <a:srgbClr val="008000"/>
+              </a:solidFill>
+            </a:endParaRPr>
+          </a:p>
+        </p:txBody>
+      </p:sp>
+      <p:sp>
+        <p:nvSpPr>
+          <p:cNvPr id="9" name="TextBox 8"/>
+          <p:cNvSpPr txBox="1"/>
+          <p:nvPr/>
+        </p:nvSpPr>
+        <p:spPr>
+          <a:xfrm>
+            <a:off x="5638443" y="1700072"/>
+            <a:ext cx="951102" cy="1938992"/>
+          </a:xfrm>
+          <a:prstGeom prst="rect">
+            <a:avLst/>
+          </a:prstGeom>
+          <a:noFill/>
+        </p:spPr>
+        <p:txBody>
+          <a:bodyPr wrap="none" rtlCol="0">
+            <a:spAutoFit/>
+          </a:bodyPr>
+          <a:lstStyle/>
+          <a:p>
+            <a:r>
+              <a:rPr lang="en-US" sz="12000" dirty="0">
+                <a:solidFill>
+                  <a:srgbClr val="008000"/>
+                </a:solidFill>
+              </a:rPr>
+              <a:t>=</a:t>
+            </a:r>
+            <a:endParaRPr lang="en-US" sz="12000" dirty="0">
+              <a:solidFill>
+                <a:srgbClr val="008000"/>
+              </a:solidFill>
+            </a:endParaRPr>
+          </a:p>
+        </p:txBody>
+      </p:sp>
+      <p:pic>
+        <p:nvPicPr>
+          <p:cNvPr id="10" name="Picture 9" descr="Screen Shot 2017-01-08 at 5.14.43 PM.png"/>
+          <p:cNvPicPr>
+            <a:picLocks noChangeAspect="1"/>
+          </p:cNvPicPr>
+          <p:nvPr/>
+        </p:nvPicPr>
+        <p:blipFill>
+          <a:blip r:embed="rId6">
+            <a:extLst>
+              <a:ext uri="{28A0092B-C50C-407E-A947-70E740481C1C}">
+                <a14:useLocalDpi xmlns:a14="http://schemas.microsoft.com/office/drawing/2010/main" val="0"/>
+              </a:ext>
+            </a:extLst>
+          </a:blip>
+          <a:stretch>
+            <a:fillRect/>
+          </a:stretch>
+        </p:blipFill>
+        <p:spPr>
+          <a:xfrm>
+            <a:off x="6497894" y="2398087"/>
+            <a:ext cx="2641600" cy="965200"/>
+          </a:xfrm>
+          <a:prstGeom prst="rect">
+            <a:avLst/>
+          </a:prstGeom>
+        </p:spPr>
+      </p:pic>
+    </p:spTree>
+    <p:extLst>
+      <p:ext uri="{BB962C8B-B14F-4D97-AF65-F5344CB8AC3E}">
+        <p14:creationId xmlns:p14="http://schemas.microsoft.com/office/powerpoint/2010/main" val="498986165"/>
+      </p:ext>
+    </p:extLst>
+  </p:cSld>
+  <p:clrMapOvr>
+    <a:masterClrMapping/>
+  </p:clrMapOvr>
+</p:sld>
+</file>
+
+<file path=ppt/slides/slide20.xml><?xml version="1.0" encoding="utf-8"?>
+<p:sld xmlns:a="http://schemas.openxmlformats.org/drawingml/2006/main" xmlns:r="http://schemas.openxmlformats.org/officeDocument/2006/relationships" xmlns:p="http://schemas.openxmlformats.org/presentationml/2006/main">
+  <p:cSld>
+    <p:spTree>
+      <p:nvGrpSpPr>
+        <p:cNvPr id="1" name=""/>
+        <p:cNvGrpSpPr/>
+        <p:nvPr/>
+      </p:nvGrpSpPr>
+      <p:grpSpPr>
+        <a:xfrm>
+          <a:off x="0" y="0"/>
+          <a:ext cx="0" cy="0"/>
+          <a:chOff x="0" y="0"/>
+          <a:chExt cx="0" cy="0"/>
+        </a:xfrm>
+      </p:grpSpPr>
+      <p:sp>
+        <p:nvSpPr>
+          <p:cNvPr id="2" name="Title 1"/>
+          <p:cNvSpPr>
+            <a:spLocks noGrp="1"/>
+          </p:cNvSpPr>
+          <p:nvPr>
+            <p:ph type="title"/>
+          </p:nvPr>
+        </p:nvSpPr>
+        <p:spPr/>
+        <p:txBody>
+          <a:bodyPr/>
+          <a:lstStyle/>
+          <a:p>
+            <a:r>
+              <a:rPr lang="en-US" dirty="0" smtClean="0"/>
+              <a:t>Reactive</a:t>
+            </a:r>
+            <a:endParaRPr lang="en-US" dirty="0"/>
+          </a:p>
+        </p:txBody>
+      </p:sp>
+      <p:sp>
+        <p:nvSpPr>
+          <p:cNvPr id="3" name="Content Placeholder 2"/>
+          <p:cNvSpPr>
+            <a:spLocks noGrp="1"/>
+          </p:cNvSpPr>
+          <p:nvPr>
+            <p:ph idx="1"/>
+          </p:nvPr>
+        </p:nvSpPr>
+        <p:spPr/>
+        <p:txBody>
+          <a:bodyPr/>
+          <a:lstStyle/>
+          <a:p>
+            <a:endParaRPr lang="en-US"/>
+          </a:p>
+        </p:txBody>
+      </p:sp>
+    </p:spTree>
+    <p:extLst>
+      <p:ext uri="{BB962C8B-B14F-4D97-AF65-F5344CB8AC3E}">
+        <p14:creationId xmlns:p14="http://schemas.microsoft.com/office/powerpoint/2010/main" val="2002376262"/>
+      </p:ext>
+    </p:extLst>
+  </p:cSld>
+  <p:clrMapOvr>
+    <a:masterClrMapping/>
+  </p:clrMapOvr>
+</p:sld>
+</file>
+
+<file path=ppt/slides/slide3.xml><?xml version="1.0" encoding="utf-8"?>
+<p:sld xmlns:a="http://schemas.openxmlformats.org/drawingml/2006/main" xmlns:r="http://schemas.openxmlformats.org/officeDocument/2006/relationships" xmlns:p="http://schemas.openxmlformats.org/presentationml/2006/main">
+  <p:cSld>
+    <p:bg>
+      <p:bgPr>
+        <a:blipFill rotWithShape="1">
+          <a:blip r:embed="rId3">
+            <a:alphaModFix amt="40000"/>
+          </a:blip>
+          <a:stretch>
+            <a:fillRect/>
+          </a:stretch>
+        </a:blipFill>
+        <a:effectLst/>
+      </p:bgPr>
+    </p:bg>
+    <p:spTree>
+      <p:nvGrpSpPr>
+        <p:cNvPr id="1" name=""/>
+        <p:cNvGrpSpPr/>
+        <p:nvPr/>
+      </p:nvGrpSpPr>
+      <p:grpSpPr>
+        <a:xfrm>
+          <a:off x="0" y="0"/>
+          <a:ext cx="0" cy="0"/>
+          <a:chOff x="0" y="0"/>
+          <a:chExt cx="0" cy="0"/>
+        </a:xfrm>
+      </p:grpSpPr>
       <p:sp>
         <p:nvSpPr>
           <p:cNvPr id="4" name="TextBox 3"/>
@@ -5215,7 +6747,9 @@
           <a:prstGeom prst="rect">
             <a:avLst/>
           </a:prstGeom>
-          <a:noFill/>
+          <a:solidFill>
+            <a:srgbClr val="008000"/>
+          </a:solidFill>
         </p:spPr>
         <p:txBody>
           <a:bodyPr wrap="square" rtlCol="0">
@@ -5229,7 +6763,23 @@
                   <a:srgbClr val="008000"/>
                 </a:solidFill>
               </a:rPr>
-              <a:t>   Source     </a:t>
+              <a:t>   </a:t>
+            </a:r>
+            <a:r>
+              <a:rPr lang="en-US" sz="6600" dirty="0" smtClean="0">
+                <a:solidFill>
+                  <a:schemeClr val="bg1"/>
+                </a:solidFill>
+              </a:rPr>
+              <a:t>Source</a:t>
+            </a:r>
+            <a:r>
+              <a:rPr lang="en-US" sz="6600" dirty="0" smtClean="0">
+                <a:solidFill>
+                  <a:srgbClr val="008000"/>
+                </a:solidFill>
+              </a:rPr>
+              <a:t>     </a:t>
             </a:r>
             <a:r>
               <a:rPr lang="en-US" sz="6600" dirty="0" smtClean="0">
@@ -5253,19 +6803,11 @@
                   <a:srgbClr val="FFFFFF"/>
                 </a:solidFill>
               </a:rPr>
-              <a:t> </a:t>
-            </a:r>
-            <a:r>
-              <a:rPr lang="en-US" sz="6600" dirty="0" smtClean="0">
-                <a:solidFill>
-                  <a:srgbClr val="008000"/>
-                </a:solidFill>
-              </a:rPr>
-              <a:t>Sink</a:t>
+              <a:t> Sink</a:t>
             </a:r>
             <a:endParaRPr lang="en-US" sz="6600" dirty="0">
               <a:solidFill>
-                <a:srgbClr val="008000"/>
+                <a:srgbClr val="FFFFFF"/>
               </a:solidFill>
             </a:endParaRPr>
           </a:p>
@@ -5280,7 +6822,7 @@
           <p:nvPr/>
         </p:nvPicPr>
         <p:blipFill>
-          <a:blip r:embed="rId3">
+          <a:blip r:embed="rId4">
             <a:extLst>
               <a:ext uri="{28A0092B-C50C-407E-A947-70E740481C1C}">
                 <a14:useLocalDpi xmlns:a14="http://schemas.microsoft.com/office/drawing/2010/main" val="0"/>
@@ -5305,175 +6847,6 @@
     <p:extLst>
       <p:ext uri="{BB962C8B-B14F-4D97-AF65-F5344CB8AC3E}">
         <p14:creationId xmlns:p14="http://schemas.microsoft.com/office/powerpoint/2010/main" val="982044158"/>
-      </p:ext>
-    </p:extLst>
-  </p:cSld>
-  <p:clrMapOvr>
-    <a:masterClrMapping/>
-  </p:clrMapOvr>
-  <p:timing>
-    <p:tnLst>
-      <p:par>
-        <p:cTn xmlns:p14="http://schemas.microsoft.com/office/powerpoint/2010/main" id="1" dur="indefinite" restart="never" nodeType="tmRoot"/>
-      </p:par>
-    </p:tnLst>
-  </p:timing>
-</p:sld>
-</file>
-
-<file path=ppt/slides/slide3.xml><?xml version="1.0" encoding="utf-8"?>
-<p:sld xmlns:a="http://schemas.openxmlformats.org/drawingml/2006/main" xmlns:r="http://schemas.openxmlformats.org/officeDocument/2006/relationships" xmlns:p="http://schemas.openxmlformats.org/presentationml/2006/main">
-  <p:cSld>
-    <p:bg>
-      <p:bgPr>
-        <a:blipFill rotWithShape="1">
-          <a:blip r:embed="rId3">
-            <a:alphaModFix amt="46000"/>
-          </a:blip>
-          <a:stretch>
-            <a:fillRect/>
-          </a:stretch>
-        </a:blipFill>
-        <a:effectLst/>
-      </p:bgPr>
-    </p:bg>
-    <p:spTree>
-      <p:nvGrpSpPr>
-        <p:cNvPr id="1" name=""/>
-        <p:cNvGrpSpPr/>
-        <p:nvPr/>
-      </p:nvGrpSpPr>
-      <p:grpSpPr>
-        <a:xfrm>
-          <a:off x="0" y="0"/>
-          <a:ext cx="0" cy="0"/>
-          <a:chOff x="0" y="0"/>
-          <a:chExt cx="0" cy="0"/>
-        </a:xfrm>
-      </p:grpSpPr>
-      <p:sp>
-        <p:nvSpPr>
-          <p:cNvPr id="2" name="Title 1"/>
-          <p:cNvSpPr>
-            <a:spLocks noGrp="1"/>
-          </p:cNvSpPr>
-          <p:nvPr>
-            <p:ph type="title"/>
-          </p:nvPr>
-        </p:nvSpPr>
-        <p:spPr/>
-        <p:txBody>
-          <a:bodyPr>
-            <a:normAutofit/>
-          </a:bodyPr>
-          <a:lstStyle/>
-          <a:p>
-            <a:r>
-              <a:rPr lang="en-US" sz="6600" dirty="0" smtClean="0"/>
-              <a:t>Source</a:t>
-            </a:r>
-            <a:endParaRPr lang="en-US" sz="6600" dirty="0"/>
-          </a:p>
-        </p:txBody>
-      </p:sp>
-      <p:sp>
-        <p:nvSpPr>
-          <p:cNvPr id="6" name="Right Triangle 5"/>
-          <p:cNvSpPr/>
-          <p:nvPr/>
-        </p:nvSpPr>
-        <p:spPr>
-          <a:xfrm>
-            <a:off x="0" y="0"/>
-            <a:ext cx="7044170" cy="6858000"/>
-          </a:xfrm>
-          <a:prstGeom prst="rtTriangle">
-            <a:avLst/>
-          </a:prstGeom>
-          <a:solidFill>
-            <a:srgbClr val="008000"/>
-          </a:solidFill>
-        </p:spPr>
-        <p:style>
-          <a:lnRef idx="1">
-            <a:schemeClr val="accent1"/>
-          </a:lnRef>
-          <a:fillRef idx="3">
-            <a:schemeClr val="accent1"/>
-          </a:fillRef>
-          <a:effectRef idx="2">
-            <a:schemeClr val="accent1"/>
-          </a:effectRef>
-          <a:fontRef idx="minor">
-            <a:schemeClr val="lt1"/>
-          </a:fontRef>
-        </p:style>
-        <p:txBody>
-          <a:bodyPr rtlCol="0" anchor="ctr"/>
-          <a:lstStyle/>
-          <a:p>
-            <a:pPr algn="ctr"/>
-            <a:endParaRPr lang="en-US"/>
-          </a:p>
-        </p:txBody>
-      </p:sp>
-      <p:sp>
-        <p:nvSpPr>
-          <p:cNvPr id="7" name="TextBox 6"/>
-          <p:cNvSpPr txBox="1"/>
-          <p:nvPr/>
-        </p:nvSpPr>
-        <p:spPr>
-          <a:xfrm>
-            <a:off x="0" y="2928068"/>
-            <a:ext cx="3976194" cy="2123658"/>
-          </a:xfrm>
-          <a:prstGeom prst="rect">
-            <a:avLst/>
-          </a:prstGeom>
-          <a:noFill/>
-        </p:spPr>
-        <p:txBody>
-          <a:bodyPr wrap="none" rtlCol="0">
-            <a:spAutoFit/>
-          </a:bodyPr>
-          <a:lstStyle/>
-          <a:p>
-            <a:r>
-              <a:rPr lang="en-US" sz="6600" dirty="0" err="1" smtClean="0">
-                <a:solidFill>
-                  <a:schemeClr val="bg1"/>
-                </a:solidFill>
-              </a:rPr>
-              <a:t>Pollable</a:t>
-            </a:r>
-            <a:endParaRPr lang="en-US" sz="6600" dirty="0" smtClean="0">
-              <a:solidFill>
-                <a:schemeClr val="bg1"/>
-              </a:solidFill>
-            </a:endParaRPr>
-          </a:p>
-          <a:p>
-            <a:r>
-              <a:rPr lang="en-US" sz="6600" dirty="0" smtClean="0">
-                <a:solidFill>
-                  <a:schemeClr val="bg1"/>
-                </a:solidFill>
-              </a:rPr>
-              <a:t>				Event</a:t>
-            </a:r>
-            <a:endParaRPr lang="en-US" sz="6600" dirty="0">
-              <a:solidFill>
-                <a:schemeClr val="bg1"/>
-              </a:solidFill>
-            </a:endParaRPr>
-          </a:p>
-        </p:txBody>
-      </p:sp>
-    </p:spTree>
-    <p:extLst>
-      <p:ext uri="{BB962C8B-B14F-4D97-AF65-F5344CB8AC3E}">
-        <p14:creationId xmlns:p14="http://schemas.microsoft.com/office/powerpoint/2010/main" val="142615455"/>
       </p:ext>
     </p:extLst>
   </p:cSld>
@@ -5522,31 +6895,6 @@
       </p:grpSpPr>
       <p:sp>
         <p:nvSpPr>
-          <p:cNvPr id="2" name="Title 1"/>
-          <p:cNvSpPr>
-            <a:spLocks noGrp="1"/>
-          </p:cNvSpPr>
-          <p:nvPr>
-            <p:ph type="title"/>
-          </p:nvPr>
-        </p:nvSpPr>
-        <p:spPr/>
-        <p:txBody>
-          <a:bodyPr>
-            <a:normAutofit/>
-          </a:bodyPr>
-          <a:lstStyle/>
-          <a:p>
-            <a:r>
-              <a:rPr lang="en-US" sz="6600" dirty="0" smtClean="0"/>
-              <a:t>Sink</a:t>
-            </a:r>
-            <a:endParaRPr lang="en-US" sz="6600" dirty="0"/>
-          </a:p>
-        </p:txBody>
-      </p:sp>
-      <p:sp>
-        <p:nvSpPr>
           <p:cNvPr id="6" name="Right Triangle 5"/>
           <p:cNvSpPr/>
           <p:nvPr/>
@@ -5588,14 +6936,14 @@
       </p:sp>
       <p:sp>
         <p:nvSpPr>
-          <p:cNvPr id="7" name="TextBox 6"/>
+          <p:cNvPr id="5" name="TextBox 4"/>
           <p:cNvSpPr txBox="1"/>
           <p:nvPr/>
         </p:nvSpPr>
         <p:spPr>
           <a:xfrm>
-            <a:off x="0" y="2928068"/>
-            <a:ext cx="4661741" cy="3139321"/>
+            <a:off x="0" y="3752990"/>
+            <a:ext cx="2538676" cy="1107996"/>
           </a:xfrm>
           <a:prstGeom prst="rect">
             <a:avLst/>
@@ -5614,43 +6962,136 @@
                   <a:schemeClr val="bg1"/>
                 </a:solidFill>
               </a:rPr>
-              <a:t>Store</a:t>
-            </a:r>
-          </a:p>
-          <a:p>
-            <a:r>
-              <a:rPr lang="en-US" sz="6600" dirty="0">
-                <a:solidFill>
-                  <a:schemeClr val="bg1"/>
-                </a:solidFill>
-              </a:rPr>
-              <a:t>	</a:t>
-            </a:r>
+              <a:t>Source</a:t>
+            </a:r>
+            <a:endParaRPr lang="en-US" sz="6600" dirty="0">
+              <a:solidFill>
+                <a:schemeClr val="bg1"/>
+              </a:solidFill>
+            </a:endParaRPr>
+          </a:p>
+        </p:txBody>
+      </p:sp>
+    </p:spTree>
+    <p:extLst>
+      <p:ext uri="{BB962C8B-B14F-4D97-AF65-F5344CB8AC3E}">
+        <p14:creationId xmlns:p14="http://schemas.microsoft.com/office/powerpoint/2010/main" val="142615455"/>
+      </p:ext>
+    </p:extLst>
+  </p:cSld>
+  <p:clrMapOvr>
+    <a:masterClrMapping/>
+  </p:clrMapOvr>
+  <p:timing>
+    <p:tnLst>
+      <p:par>
+        <p:cTn xmlns:p14="http://schemas.microsoft.com/office/powerpoint/2010/main" id="1" dur="indefinite" restart="never" nodeType="tmRoot"/>
+      </p:par>
+    </p:tnLst>
+  </p:timing>
+</p:sld>
+</file>
+
+<file path=ppt/slides/slide5.xml><?xml version="1.0" encoding="utf-8"?>
+<p:sld xmlns:a="http://schemas.openxmlformats.org/drawingml/2006/main" xmlns:r="http://schemas.openxmlformats.org/officeDocument/2006/relationships" xmlns:p="http://schemas.openxmlformats.org/presentationml/2006/main">
+  <p:cSld>
+    <p:bg>
+      <p:bgPr>
+        <a:blipFill rotWithShape="1">
+          <a:blip r:embed="rId3">
+            <a:alphaModFix amt="46000"/>
+          </a:blip>
+          <a:stretch>
+            <a:fillRect/>
+          </a:stretch>
+        </a:blipFill>
+        <a:effectLst/>
+      </p:bgPr>
+    </p:bg>
+    <p:spTree>
+      <p:nvGrpSpPr>
+        <p:cNvPr id="1" name=""/>
+        <p:cNvGrpSpPr/>
+        <p:nvPr/>
+      </p:nvGrpSpPr>
+      <p:grpSpPr>
+        <a:xfrm>
+          <a:off x="0" y="0"/>
+          <a:ext cx="0" cy="0"/>
+          <a:chOff x="0" y="0"/>
+          <a:chExt cx="0" cy="0"/>
+        </a:xfrm>
+      </p:grpSpPr>
+      <p:sp>
+        <p:nvSpPr>
+          <p:cNvPr id="6" name="Right Triangle 5"/>
+          <p:cNvSpPr/>
+          <p:nvPr/>
+        </p:nvSpPr>
+        <p:spPr>
+          <a:xfrm>
+            <a:off x="0" y="0"/>
+            <a:ext cx="7044170" cy="6858000"/>
+          </a:xfrm>
+          <a:prstGeom prst="rtTriangle">
+            <a:avLst/>
+          </a:prstGeom>
+          <a:solidFill>
+            <a:srgbClr val="008000"/>
+          </a:solidFill>
+        </p:spPr>
+        <p:style>
+          <a:lnRef idx="1">
+            <a:schemeClr val="accent1"/>
+          </a:lnRef>
+          <a:fillRef idx="3">
+            <a:schemeClr val="accent1"/>
+          </a:fillRef>
+          <a:effectRef idx="2">
+            <a:schemeClr val="accent1"/>
+          </a:effectRef>
+          <a:fontRef idx="minor">
+            <a:schemeClr val="lt1"/>
+          </a:fontRef>
+        </p:style>
+        <p:txBody>
+          <a:bodyPr rtlCol="0" anchor="ctr"/>
+          <a:lstStyle/>
+          <a:p>
+            <a:pPr algn="ctr"/>
+            <a:endParaRPr lang="en-US"/>
+          </a:p>
+        </p:txBody>
+      </p:sp>
+      <p:sp>
+        <p:nvSpPr>
+          <p:cNvPr id="5" name="TextBox 4"/>
+          <p:cNvSpPr txBox="1"/>
+          <p:nvPr/>
+        </p:nvSpPr>
+        <p:spPr>
+          <a:xfrm>
+            <a:off x="0" y="3752990"/>
+            <a:ext cx="1597237" cy="1107996"/>
+          </a:xfrm>
+          <a:prstGeom prst="rect">
+            <a:avLst/>
+          </a:prstGeom>
+          <a:noFill/>
+        </p:spPr>
+        <p:txBody>
+          <a:bodyPr wrap="none" rtlCol="0">
+            <a:spAutoFit/>
+          </a:bodyPr>
+          <a:lstStyle/>
+          <a:p>
             <a:r>
               <a:rPr lang="en-US" sz="6600" dirty="0" smtClean="0">
                 <a:solidFill>
                   <a:schemeClr val="bg1"/>
                 </a:solidFill>
               </a:rPr>
-              <a:t>Send Out</a:t>
-            </a:r>
-          </a:p>
-          <a:p>
-            <a:r>
-              <a:rPr lang="en-US" sz="6600" dirty="0">
-                <a:solidFill>
-                  <a:schemeClr val="bg1"/>
-                </a:solidFill>
-              </a:rPr>
-              <a:t>	</a:t>
-            </a:r>
-            <a:r>
-              <a:rPr lang="en-US" sz="6600" dirty="0" smtClean="0">
-                <a:solidFill>
-                  <a:schemeClr val="bg1"/>
-                </a:solidFill>
-              </a:rPr>
-              <a:t>	Terminate</a:t>
+              <a:t>Sink</a:t>
             </a:r>
             <a:endParaRPr lang="en-US" sz="6600" dirty="0">
               <a:solidFill>
@@ -5680,7 +7121,7 @@
 </p:sld>
 </file>
 
-<file path=ppt/slides/slide5.xml><?xml version="1.0" encoding="utf-8"?>
+<file path=ppt/slides/slide6.xml><?xml version="1.0" encoding="utf-8"?>
 <p:sld xmlns:a="http://schemas.openxmlformats.org/drawingml/2006/main" xmlns:r="http://schemas.openxmlformats.org/officeDocument/2006/relationships" xmlns:p="http://schemas.openxmlformats.org/presentationml/2006/main">
   <p:cSld>
     <p:bg>
@@ -5800,7 +7241,7 @@
           <p:nvPr/>
         </p:nvPicPr>
         <p:blipFill>
-          <a:blip r:embed="rId2">
+          <a:blip r:embed="rId3">
             <a:extLst>
               <a:ext uri="{28A0092B-C50C-407E-A947-70E740481C1C}">
                 <a14:useLocalDpi xmlns:a14="http://schemas.microsoft.com/office/drawing/2010/main" val="0"/>
@@ -5841,7 +7282,7 @@
 </p:sld>
 </file>
 
-<file path=ppt/slides/slide6.xml><?xml version="1.0" encoding="utf-8"?>
+<file path=ppt/slides/slide7.xml><?xml version="1.0" encoding="utf-8"?>
 <p:sld xmlns:a="http://schemas.openxmlformats.org/drawingml/2006/main" xmlns:r="http://schemas.openxmlformats.org/officeDocument/2006/relationships" xmlns:p="http://schemas.openxmlformats.org/presentationml/2006/main">
   <p:cSld>
     <p:bg>
@@ -5873,31 +7314,6 @@
       </p:grpSpPr>
       <p:sp>
         <p:nvSpPr>
-          <p:cNvPr id="2" name="Title 1"/>
-          <p:cNvSpPr>
-            <a:spLocks noGrp="1"/>
-          </p:cNvSpPr>
-          <p:nvPr>
-            <p:ph type="title"/>
-          </p:nvPr>
-        </p:nvSpPr>
-        <p:spPr/>
-        <p:txBody>
-          <a:bodyPr>
-            <a:normAutofit/>
-          </a:bodyPr>
-          <a:lstStyle/>
-          <a:p>
-            <a:r>
-              <a:rPr lang="en-US" sz="6600" dirty="0" smtClean="0"/>
-              <a:t>Processor</a:t>
-            </a:r>
-            <a:endParaRPr lang="en-US" sz="6600" dirty="0"/>
-          </a:p>
-        </p:txBody>
-      </p:sp>
-      <p:sp>
-        <p:nvSpPr>
           <p:cNvPr id="6" name="Right Triangle 5"/>
           <p:cNvSpPr/>
           <p:nvPr/>
@@ -5945,8 +7361,8 @@
         </p:nvSpPr>
         <p:spPr>
           <a:xfrm>
-            <a:off x="0" y="2928068"/>
-            <a:ext cx="4210821" cy="3139321"/>
+            <a:off x="0" y="3752990"/>
+            <a:ext cx="3545825" cy="1107996"/>
           </a:xfrm>
           <a:prstGeom prst="rect">
             <a:avLst/>
@@ -5965,40 +7381,7 @@
                   <a:schemeClr val="bg1"/>
                 </a:solidFill>
               </a:rPr>
-              <a:t>Filter		</a:t>
-            </a:r>
-            <a:endParaRPr lang="en-US" sz="6600" dirty="0">
-              <a:solidFill>
-                <a:schemeClr val="bg1"/>
-              </a:solidFill>
-            </a:endParaRPr>
-          </a:p>
-          <a:p>
-            <a:r>
-              <a:rPr lang="en-US" sz="6600" dirty="0" smtClean="0">
-                <a:solidFill>
-                  <a:schemeClr val="bg1"/>
-                </a:solidFill>
-              </a:rPr>
-              <a:t>	Transform</a:t>
-            </a:r>
-          </a:p>
-          <a:p>
-            <a:r>
-              <a:rPr lang="en-US" sz="6600" dirty="0">
-                <a:solidFill>
-                  <a:schemeClr val="bg1"/>
-                </a:solidFill>
-              </a:rPr>
-              <a:t>	</a:t>
-            </a:r>
-            <a:r>
-              <a:rPr lang="en-US" sz="6600" dirty="0" smtClean="0">
-                <a:solidFill>
-                  <a:schemeClr val="bg1"/>
-                </a:solidFill>
-              </a:rPr>
-              <a:t>	 Enrich</a:t>
+              <a:t>Processor</a:t>
             </a:r>
             <a:endParaRPr lang="en-US" sz="6600" dirty="0">
               <a:solidFill>
@@ -6028,9 +7411,35 @@
 </p:sld>
 </file>
 
-<file path=ppt/slides/slide7.xml><?xml version="1.0" encoding="utf-8"?>
+<file path=ppt/slides/slide8.xml><?xml version="1.0" encoding="utf-8"?>
 <p:sld xmlns:a="http://schemas.openxmlformats.org/drawingml/2006/main" xmlns:r="http://schemas.openxmlformats.org/officeDocument/2006/relationships" xmlns:p="http://schemas.openxmlformats.org/presentationml/2006/main">
   <p:cSld>
+    <p:bg>
+      <p:bgPr>
+        <a:blipFill rotWithShape="1">
+          <a:blip r:embed="rId3">
+            <a:extLst>
+              <a:ext uri="{BEBA8EAE-BF5A-486C-A8C5-ECC9F3942E4B}">
+                <a14:imgProps xmlns:a14="http://schemas.microsoft.com/office/drawing/2010/main">
+                  <a14:imgLayer r:embed="rId4">
+                    <a14:imgEffect>
+                      <a14:colorTemperature colorTemp="4652"/>
+                    </a14:imgEffect>
+                    <a14:imgEffect>
+                      <a14:saturation sat="0"/>
+                    </a14:imgEffect>
+                  </a14:imgLayer>
+                </a14:imgProps>
+              </a:ext>
+            </a:extLst>
+          </a:blip>
+          <a:stretch>
+            <a:fillRect/>
+          </a:stretch>
+        </a:blipFill>
+        <a:effectLst/>
+      </p:bgPr>
+    </p:bg>
     <p:spTree>
       <p:nvGrpSpPr>
         <p:cNvPr id="1" name=""/>
@@ -6047,43 +7456,46 @@
       </p:grpSpPr>
       <p:sp>
         <p:nvSpPr>
-          <p:cNvPr id="2" name="Title 1"/>
-          <p:cNvSpPr>
-            <a:spLocks noGrp="1"/>
-          </p:cNvSpPr>
-          <p:nvPr>
-            <p:ph type="title"/>
-          </p:nvPr>
-        </p:nvSpPr>
-        <p:spPr/>
-        <p:txBody>
-          <a:bodyPr/>
-          <a:lstStyle/>
-          <a:p>
-            <a:r>
-              <a:rPr lang="en-US" dirty="0" smtClean="0"/>
-              <a:t>Demo basic stream</a:t>
-            </a:r>
-            <a:endParaRPr lang="en-US" dirty="0"/>
-          </a:p>
-        </p:txBody>
-      </p:sp>
-      <p:sp>
-        <p:nvSpPr>
-          <p:cNvPr id="3" name="Content Placeholder 2"/>
-          <p:cNvSpPr>
-            <a:spLocks noGrp="1"/>
-          </p:cNvSpPr>
-          <p:nvPr>
-            <p:ph idx="1"/>
-          </p:nvPr>
-        </p:nvSpPr>
-        <p:spPr/>
-        <p:txBody>
-          <a:bodyPr/>
-          <a:lstStyle/>
-          <a:p>
-            <a:endParaRPr lang="en-US"/>
+          <p:cNvPr id="9" name="Rectangle 8"/>
+          <p:cNvSpPr/>
+          <p:nvPr/>
+        </p:nvSpPr>
+        <p:spPr>
+          <a:xfrm>
+            <a:off x="3312593" y="0"/>
+            <a:ext cx="5831407" cy="1472587"/>
+          </a:xfrm>
+          <a:prstGeom prst="rect">
+            <a:avLst/>
+          </a:prstGeom>
+          <a:solidFill>
+            <a:srgbClr val="008000"/>
+          </a:solidFill>
+        </p:spPr>
+        <p:style>
+          <a:lnRef idx="1">
+            <a:schemeClr val="accent1"/>
+          </a:lnRef>
+          <a:fillRef idx="3">
+            <a:schemeClr val="accent1"/>
+          </a:fillRef>
+          <a:effectRef idx="2">
+            <a:schemeClr val="accent1"/>
+          </a:effectRef>
+          <a:fontRef idx="minor">
+            <a:schemeClr val="lt1"/>
+          </a:fontRef>
+        </p:style>
+        <p:txBody>
+          <a:bodyPr rtlCol="0" anchor="ctr"/>
+          <a:lstStyle/>
+          <a:p>
+            <a:pPr algn="ctr"/>
+            <a:r>
+              <a:rPr lang="en-US" sz="6600" dirty="0" smtClean="0"/>
+              <a:t>Demo</a:t>
+            </a:r>
+            <a:endParaRPr lang="en-US" sz="6600" dirty="0"/>
           </a:p>
         </p:txBody>
       </p:sp>
@@ -6091,78 +7503,6 @@
     <p:extLst>
       <p:ext uri="{BB962C8B-B14F-4D97-AF65-F5344CB8AC3E}">
         <p14:creationId xmlns:p14="http://schemas.microsoft.com/office/powerpoint/2010/main" val="4188754868"/>
-      </p:ext>
-    </p:extLst>
-  </p:cSld>
-  <p:clrMapOvr>
-    <a:masterClrMapping/>
-  </p:clrMapOvr>
-</p:sld>
-</file>
-
-<file path=ppt/slides/slide8.xml><?xml version="1.0" encoding="utf-8"?>
-<p:sld xmlns:a="http://schemas.openxmlformats.org/drawingml/2006/main" xmlns:r="http://schemas.openxmlformats.org/officeDocument/2006/relationships" xmlns:p="http://schemas.openxmlformats.org/presentationml/2006/main">
-  <p:cSld>
-    <p:spTree>
-      <p:nvGrpSpPr>
-        <p:cNvPr id="1" name=""/>
-        <p:cNvGrpSpPr/>
-        <p:nvPr/>
-      </p:nvGrpSpPr>
-      <p:grpSpPr>
-        <a:xfrm>
-          <a:off x="0" y="0"/>
-          <a:ext cx="0" cy="0"/>
-          <a:chOff x="0" y="0"/>
-          <a:chExt cx="0" cy="0"/>
-        </a:xfrm>
-      </p:grpSpPr>
-      <p:sp>
-        <p:nvSpPr>
-          <p:cNvPr id="2" name="Title 1"/>
-          <p:cNvSpPr>
-            <a:spLocks noGrp="1"/>
-          </p:cNvSpPr>
-          <p:nvPr>
-            <p:ph type="title"/>
-          </p:nvPr>
-        </p:nvSpPr>
-        <p:spPr/>
-        <p:txBody>
-          <a:bodyPr/>
-          <a:lstStyle/>
-          <a:p>
-            <a:r>
-              <a:rPr lang="en-US" dirty="0" smtClean="0"/>
-              <a:t>Spring Cloud Stream Apps</a:t>
-            </a:r>
-            <a:endParaRPr lang="en-US" dirty="0"/>
-          </a:p>
-        </p:txBody>
-      </p:sp>
-      <p:sp>
-        <p:nvSpPr>
-          <p:cNvPr id="3" name="Content Placeholder 2"/>
-          <p:cNvSpPr>
-            <a:spLocks noGrp="1"/>
-          </p:cNvSpPr>
-          <p:nvPr>
-            <p:ph idx="1"/>
-          </p:nvPr>
-        </p:nvSpPr>
-        <p:spPr/>
-        <p:txBody>
-          <a:bodyPr/>
-          <a:lstStyle/>
-          <a:p>
-            <a:endParaRPr lang="en-US"/>
-          </a:p>
-        </p:txBody>
-      </p:sp>
-    </p:spTree>
-    <p:extLst>
-      <p:ext uri="{BB962C8B-B14F-4D97-AF65-F5344CB8AC3E}">
-        <p14:creationId xmlns:p14="http://schemas.microsoft.com/office/powerpoint/2010/main" val="3700327810"/>
       </p:ext>
     </p:extLst>
   </p:cSld>
@@ -6206,7 +7546,7 @@
           <a:p>
             <a:r>
               <a:rPr lang="en-US" dirty="0" smtClean="0"/>
-              <a:t>Deploying</a:t>
+              <a:t>App Properties</a:t>
             </a:r>
             <a:endParaRPr lang="en-US" dirty="0"/>
           </a:p>
@@ -6234,7 +7574,7 @@
     </p:spTree>
     <p:extLst>
       <p:ext uri="{BB962C8B-B14F-4D97-AF65-F5344CB8AC3E}">
-        <p14:creationId xmlns:p14="http://schemas.microsoft.com/office/powerpoint/2010/main" val="466818822"/>
+        <p14:creationId xmlns:p14="http://schemas.microsoft.com/office/powerpoint/2010/main" val="681315715"/>
       </p:ext>
     </p:extLst>
   </p:cSld>

</xml_diff>